<commit_message>
docs : added FXAATAA
</commit_message>
<xml_diff>
--- a/GPU Project/Benchmarks/CapstoneAA.pptx
+++ b/GPU Project/Benchmarks/CapstoneAA.pptx
@@ -1,30 +1,30 @@
 
 <file path=ppt/presentation.xml><?xml version="1.0" encoding="utf-8"?>
-<p:presentation xmlns:a="http://schemas.openxmlformats.org/drawingml/2006/main" xmlns:r="http://schemas.openxmlformats.org/officeDocument/2006/relationships" xmlns:p="http://schemas.openxmlformats.org/presentationml/2006/main" xmlns:p14="http://schemas.microsoft.com/office/powerpoint/2010/main">
+<p:presentation xmlns:a="http://schemas.openxmlformats.org/drawingml/2006/main" xmlns:r="http://schemas.openxmlformats.org/officeDocument/2006/relationships" xmlns:p="http://schemas.openxmlformats.org/presentationml/2006/main">
   <p:sldMasterIdLst>
-    <p:sldMasterId id="2147483677" r:id="rId16"/>
-    <p:sldMasterId id="2147483678" r:id="rId18"/>
+    <p:sldMasterId id="2147483677" r:id="rId1"/>
+    <p:sldMasterId id="2147483678" r:id="rId2"/>
   </p:sldMasterIdLst>
   <p:sldIdLst>
-    <p:sldId id="256" r:id="rId20"/>
-    <p:sldId id="257" r:id="rId21"/>
-    <p:sldId id="274" r:id="rId22"/>
-    <p:sldId id="275" r:id="rId23"/>
-    <p:sldId id="273" r:id="rId24"/>
-    <p:sldId id="271" r:id="rId25"/>
-    <p:sldId id="260" r:id="rId26"/>
-    <p:sldId id="267" r:id="rId27"/>
-    <p:sldId id="270" r:id="rId28"/>
-    <p:sldId id="269" r:id="rId29"/>
-    <p:sldId id="272" r:id="rId30"/>
-    <p:sldId id="268" r:id="rId31"/>
-    <p:sldId id="264" r:id="rId32"/>
-    <p:sldId id="266" r:id="rId33"/>
-    <p:sldId id="265" r:id="rId34"/>
-    <p:sldId id="276" r:id="rId35"/>
-    <p:sldId id="277" r:id="rId36"/>
+    <p:sldId id="256" r:id="rId3"/>
+    <p:sldId id="257" r:id="rId4"/>
+    <p:sldId id="274" r:id="rId5"/>
+    <p:sldId id="275" r:id="rId6"/>
+    <p:sldId id="273" r:id="rId7"/>
+    <p:sldId id="271" r:id="rId8"/>
+    <p:sldId id="260" r:id="rId9"/>
+    <p:sldId id="267" r:id="rId10"/>
+    <p:sldId id="270" r:id="rId11"/>
+    <p:sldId id="269" r:id="rId12"/>
+    <p:sldId id="272" r:id="rId13"/>
+    <p:sldId id="268" r:id="rId14"/>
+    <p:sldId id="264" r:id="rId15"/>
+    <p:sldId id="266" r:id="rId16"/>
+    <p:sldId id="265" r:id="rId17"/>
+    <p:sldId id="276" r:id="rId18"/>
+    <p:sldId id="277" r:id="rId19"/>
   </p:sldIdLst>
-  <p:sldSz cx="9144000" cy="5143500"/>
+  <p:sldSz cx="9144000" cy="5143500" type="screen16x9"/>
   <p:notesSz cx="6858000" cy="9144000"/>
   <p:defaultTextStyle>
     <a:defPPr>
@@ -142,6 +142,7 @@
 
 <file path=ppt/commentAuthors.xml><?xml version="1.0" encoding="utf-8"?>
 <p:cmAuthorLst xmlns:a="http://schemas.openxmlformats.org/drawingml/2006/main" xmlns:r="http://schemas.openxmlformats.org/officeDocument/2006/relationships" xmlns:p="http://schemas.openxmlformats.org/presentationml/2006/main">
+  <p:cmAuthor id="0" name="알 수 없는 사용자1" initials="알 수 없는 사용자1" lastIdx="15" clrIdx="1"/>
   <p:cmAuthor id="1" name="copy" initials="c" lastIdx="11" clrIdx="0"/>
 </p:cmAuthorLst>
 </file>
@@ -415,6 +416,7 @@
           <a:p>
             <a:fld id="{63937D59-5EDB-4C39-B697-625748F703B6}" type="datetimeFigureOut">
               <a:rPr lang="en-US" smtClean="0"/>
+              <a:t>10/3/2023</a:t>
             </a:fld>
             <a:endParaRPr lang="en-US"/>
           </a:p>
@@ -456,6 +458,7 @@
           <a:p>
             <a:fld id="{0F31DC1F-5561-484E-AB46-68C682854F61}" type="slidenum">
               <a:rPr lang="en-US" smtClean="0"/>
+              <a:t>‹#›</a:t>
             </a:fld>
             <a:endParaRPr lang="en-US"/>
           </a:p>
@@ -511,10 +514,9 @@
           </a:lstStyle>
           <a:p>
             <a:r>
-              <a:rPr lang="en-US" smtClean="0"/>
+              <a:rPr lang="en-US"/>
               <a:t>Click to edit Master title style</a:t>
             </a:r>
-            <a:endParaRPr lang="en-US"/>
           </a:p>
         </p:txBody>
       </p:sp>
@@ -568,42 +570,37 @@
           <a:p>
             <a:pPr lvl="0"/>
             <a:r>
-              <a:rPr lang="en-US" smtClean="0"/>
+              <a:rPr lang="en-US"/>
               <a:t>Click to edit Master text styles</a:t>
             </a:r>
-            <a:endParaRPr lang="en-US" smtClean="0"/>
           </a:p>
           <a:p>
             <a:pPr lvl="1"/>
             <a:r>
-              <a:rPr lang="en-US" smtClean="0"/>
+              <a:rPr lang="en-US"/>
               <a:t>Second level</a:t>
             </a:r>
-            <a:endParaRPr lang="en-US" smtClean="0"/>
           </a:p>
           <a:p>
             <a:pPr lvl="2"/>
             <a:r>
-              <a:rPr lang="en-US" smtClean="0"/>
+              <a:rPr lang="en-US"/>
               <a:t>Third level</a:t>
             </a:r>
-            <a:endParaRPr lang="en-US" smtClean="0"/>
           </a:p>
           <a:p>
             <a:pPr lvl="3"/>
             <a:r>
-              <a:rPr lang="en-US" smtClean="0"/>
+              <a:rPr lang="en-US"/>
               <a:t>Fourth level</a:t>
             </a:r>
-            <a:endParaRPr lang="en-US" smtClean="0"/>
           </a:p>
           <a:p>
             <a:pPr lvl="4"/>
             <a:r>
-              <a:rPr lang="en-US" smtClean="0"/>
+              <a:rPr lang="en-US"/>
               <a:t>Fifth level</a:t>
             </a:r>
-            <a:endParaRPr lang="en-US"/>
           </a:p>
         </p:txBody>
       </p:sp>
@@ -666,10 +663,9 @@
           <a:p>
             <a:pPr lvl="0"/>
             <a:r>
-              <a:rPr lang="en-US" smtClean="0"/>
+              <a:rPr lang="en-US"/>
               <a:t>Click to edit Master text styles</a:t>
             </a:r>
-            <a:endParaRPr lang="en-US" smtClean="0"/>
           </a:p>
         </p:txBody>
       </p:sp>
@@ -690,6 +686,7 @@
           <a:p>
             <a:fld id="{63937D59-5EDB-4C39-B697-625748F703B6}" type="datetimeFigureOut">
               <a:rPr lang="en-US" smtClean="0"/>
+              <a:t>10/3/2023</a:t>
             </a:fld>
             <a:endParaRPr lang="en-US"/>
           </a:p>
@@ -731,6 +728,7 @@
           <a:p>
             <a:fld id="{0F31DC1F-5561-484E-AB46-68C682854F61}" type="slidenum">
               <a:rPr lang="en-US" smtClean="0"/>
+              <a:t>‹#›</a:t>
             </a:fld>
             <a:endParaRPr lang="en-US"/>
           </a:p>
@@ -786,10 +784,9 @@
           </a:lstStyle>
           <a:p>
             <a:r>
-              <a:rPr lang="en-US" smtClean="0"/>
+              <a:rPr lang="en-US"/>
               <a:t>Click to edit Master title style</a:t>
             </a:r>
-            <a:endParaRPr lang="en-US"/>
           </a:p>
         </p:txBody>
       </p:sp>
@@ -913,10 +910,9 @@
           <a:p>
             <a:pPr lvl="0"/>
             <a:r>
-              <a:rPr lang="en-US" smtClean="0"/>
+              <a:rPr lang="en-US"/>
               <a:t>Click to edit Master text styles</a:t>
             </a:r>
-            <a:endParaRPr lang="en-US" smtClean="0"/>
           </a:p>
         </p:txBody>
       </p:sp>
@@ -937,6 +933,7 @@
           <a:p>
             <a:fld id="{63937D59-5EDB-4C39-B697-625748F703B6}" type="datetimeFigureOut">
               <a:rPr lang="en-US" smtClean="0"/>
+              <a:t>10/3/2023</a:t>
             </a:fld>
             <a:endParaRPr lang="en-US"/>
           </a:p>
@@ -978,6 +975,7 @@
           <a:p>
             <a:fld id="{0F31DC1F-5561-484E-AB46-68C682854F61}" type="slidenum">
               <a:rPr lang="en-US" smtClean="0"/>
+              <a:t>‹#›</a:t>
             </a:fld>
             <a:endParaRPr lang="en-US"/>
           </a:p>
@@ -1024,10 +1022,9 @@
           <a:lstStyle/>
           <a:p>
             <a:r>
-              <a:rPr lang="en-US" smtClean="0"/>
+              <a:rPr lang="en-US"/>
               <a:t>Click to edit Master title style</a:t>
             </a:r>
-            <a:endParaRPr lang="en-US"/>
           </a:p>
         </p:txBody>
       </p:sp>
@@ -1048,42 +1045,37 @@
           <a:p>
             <a:pPr lvl="0"/>
             <a:r>
-              <a:rPr lang="en-US" smtClean="0"/>
+              <a:rPr lang="en-US"/>
               <a:t>Click to edit Master text styles</a:t>
             </a:r>
-            <a:endParaRPr lang="en-US" smtClean="0"/>
           </a:p>
           <a:p>
             <a:pPr lvl="1"/>
             <a:r>
-              <a:rPr lang="en-US" smtClean="0"/>
+              <a:rPr lang="en-US"/>
               <a:t>Second level</a:t>
             </a:r>
-            <a:endParaRPr lang="en-US" smtClean="0"/>
           </a:p>
           <a:p>
             <a:pPr lvl="2"/>
             <a:r>
-              <a:rPr lang="en-US" smtClean="0"/>
+              <a:rPr lang="en-US"/>
               <a:t>Third level</a:t>
             </a:r>
-            <a:endParaRPr lang="en-US" smtClean="0"/>
           </a:p>
           <a:p>
             <a:pPr lvl="3"/>
             <a:r>
-              <a:rPr lang="en-US" smtClean="0"/>
+              <a:rPr lang="en-US"/>
               <a:t>Fourth level</a:t>
             </a:r>
-            <a:endParaRPr lang="en-US" smtClean="0"/>
           </a:p>
           <a:p>
             <a:pPr lvl="4"/>
             <a:r>
-              <a:rPr lang="en-US" smtClean="0"/>
+              <a:rPr lang="en-US"/>
               <a:t>Fifth level</a:t>
             </a:r>
-            <a:endParaRPr lang="en-US"/>
           </a:p>
         </p:txBody>
       </p:sp>
@@ -1104,6 +1096,7 @@
           <a:p>
             <a:fld id="{63937D59-5EDB-4C39-B697-625748F703B6}" type="datetimeFigureOut">
               <a:rPr lang="en-US" smtClean="0"/>
+              <a:t>10/3/2023</a:t>
             </a:fld>
             <a:endParaRPr lang="en-US"/>
           </a:p>
@@ -1145,6 +1138,7 @@
           <a:p>
             <a:fld id="{0F31DC1F-5561-484E-AB46-68C682854F61}" type="slidenum">
               <a:rPr lang="en-US" smtClean="0"/>
+              <a:t>‹#›</a:t>
             </a:fld>
             <a:endParaRPr lang="en-US"/>
           </a:p>
@@ -1196,10 +1190,9 @@
           <a:lstStyle/>
           <a:p>
             <a:r>
-              <a:rPr lang="en-US" smtClean="0"/>
+              <a:rPr lang="en-US"/>
               <a:t>Click to edit Master title style</a:t>
             </a:r>
-            <a:endParaRPr lang="en-US"/>
           </a:p>
         </p:txBody>
       </p:sp>
@@ -1225,42 +1218,37 @@
           <a:p>
             <a:pPr lvl="0"/>
             <a:r>
-              <a:rPr lang="en-US" smtClean="0"/>
+              <a:rPr lang="en-US"/>
               <a:t>Click to edit Master text styles</a:t>
             </a:r>
-            <a:endParaRPr lang="en-US" smtClean="0"/>
           </a:p>
           <a:p>
             <a:pPr lvl="1"/>
             <a:r>
-              <a:rPr lang="en-US" smtClean="0"/>
+              <a:rPr lang="en-US"/>
               <a:t>Second level</a:t>
             </a:r>
-            <a:endParaRPr lang="en-US" smtClean="0"/>
           </a:p>
           <a:p>
             <a:pPr lvl="2"/>
             <a:r>
-              <a:rPr lang="en-US" smtClean="0"/>
+              <a:rPr lang="en-US"/>
               <a:t>Third level</a:t>
             </a:r>
-            <a:endParaRPr lang="en-US" smtClean="0"/>
           </a:p>
           <a:p>
             <a:pPr lvl="3"/>
             <a:r>
-              <a:rPr lang="en-US" smtClean="0"/>
+              <a:rPr lang="en-US"/>
               <a:t>Fourth level</a:t>
             </a:r>
-            <a:endParaRPr lang="en-US" smtClean="0"/>
           </a:p>
           <a:p>
             <a:pPr lvl="4"/>
             <a:r>
-              <a:rPr lang="en-US" smtClean="0"/>
+              <a:rPr lang="en-US"/>
               <a:t>Fifth level</a:t>
             </a:r>
-            <a:endParaRPr lang="en-US"/>
           </a:p>
         </p:txBody>
       </p:sp>
@@ -1281,6 +1269,7 @@
           <a:p>
             <a:fld id="{63937D59-5EDB-4C39-B697-625748F703B6}" type="datetimeFigureOut">
               <a:rPr lang="en-US" smtClean="0"/>
+              <a:t>10/3/2023</a:t>
             </a:fld>
             <a:endParaRPr lang="en-US"/>
           </a:p>
@@ -1322,6 +1311,7 @@
           <a:p>
             <a:fld id="{0F31DC1F-5561-484E-AB46-68C682854F61}" type="slidenum">
               <a:rPr lang="en-US" smtClean="0"/>
+              <a:t>‹#›</a:t>
             </a:fld>
             <a:endParaRPr lang="en-US"/>
           </a:p>
@@ -1398,7 +1388,7 @@
           </a:lstStyle>
           <a:p>
             <a:r>
-              <a:rPr lang="en-US" altLang="ko-KR" dirty="0" smtClean="0"/>
+              <a:rPr lang="en-US" altLang="ko-KR" dirty="0"/>
               <a:t> Click to edit title</a:t>
             </a:r>
             <a:endParaRPr lang="ko-KR" altLang="en-US" dirty="0"/>
@@ -1442,10 +1432,9 @@
           <a:p>
             <a:pPr lvl="0"/>
             <a:r>
-              <a:rPr lang="en-US" altLang="ko-KR" dirty="0" smtClean="0"/>
+              <a:rPr lang="en-US" altLang="ko-KR" dirty="0"/>
               <a:t>Click to edit Master text styles</a:t>
             </a:r>
-            <a:endParaRPr lang="en-US" altLang="ko-KR" dirty="0" smtClean="0"/>
           </a:p>
         </p:txBody>
       </p:sp>
@@ -1486,10 +1475,9 @@
           <a:p>
             <a:pPr lvl="0"/>
             <a:r>
-              <a:rPr lang="en-US" altLang="ko-KR" dirty="0" smtClean="0"/>
+              <a:rPr lang="en-US" altLang="ko-KR" dirty="0"/>
               <a:t>Click to edit Master text styles</a:t>
             </a:r>
-            <a:endParaRPr lang="en-US" altLang="ko-KR" dirty="0" smtClean="0"/>
           </a:p>
         </p:txBody>
       </p:sp>
@@ -1502,7 +1490,7 @@
 </file>
 
 <file path=ppt/slideLayouts/slideLayout3.xml><?xml version="1.0" encoding="utf-8"?>
-<p:sldLayout xmlns:a="http://schemas.openxmlformats.org/drawingml/2006/main" xmlns:r="http://schemas.openxmlformats.org/officeDocument/2006/relationships" xmlns:p="http://schemas.openxmlformats.org/presentationml/2006/main" xmlns:p14="http://schemas.microsoft.com/office/powerpoint/2010/main" preserve="1" userDrawn="1">
+<p:sldLayout xmlns:a="http://schemas.openxmlformats.org/drawingml/2006/main" xmlns:r="http://schemas.openxmlformats.org/officeDocument/2006/relationships" xmlns:p="http://schemas.openxmlformats.org/presentationml/2006/main" preserve="1" userDrawn="1">
   <p:cSld name="1_Title and Content">
     <p:bg>
       <p:bgPr>
@@ -1518,6 +1506,7 @@
             <a:fillRect/>
           </a:stretch>
         </a:blipFill>
+        <a:effectLst/>
       </p:bgPr>
     </p:bg>
     <p:spTree>
@@ -1569,7 +1558,7 @@
           </a:lstStyle>
           <a:p>
             <a:r>
-              <a:rPr lang="en-US" altLang="ko-KR" dirty="0" smtClean="0"/>
+              <a:rPr lang="en-US" altLang="ko-KR" dirty="0"/>
               <a:t> Click to edit title</a:t>
             </a:r>
             <a:endParaRPr lang="ko-KR" altLang="en-US" dirty="0"/>
@@ -1613,10 +1602,9 @@
           <a:p>
             <a:pPr lvl="0"/>
             <a:r>
-              <a:rPr lang="en-US" altLang="ko-KR" dirty="0" smtClean="0"/>
+              <a:rPr lang="en-US" altLang="ko-KR" dirty="0"/>
               <a:t>Click to edit Master text styles</a:t>
             </a:r>
-            <a:endParaRPr lang="en-US" altLang="ko-KR" dirty="0" smtClean="0"/>
           </a:p>
         </p:txBody>
       </p:sp>
@@ -1657,10 +1645,9 @@
           <a:p>
             <a:pPr lvl="0"/>
             <a:r>
-              <a:rPr lang="en-US" altLang="ko-KR" dirty="0" smtClean="0"/>
+              <a:rPr lang="en-US" altLang="ko-KR" dirty="0"/>
               <a:t>Click to edit Master text styles</a:t>
             </a:r>
-            <a:endParaRPr lang="en-US" altLang="ko-KR" dirty="0" smtClean="0"/>
           </a:p>
         </p:txBody>
       </p:sp>
@@ -1669,14 +1656,6 @@
   <p:clrMapOvr>
     <a:masterClrMapping/>
   </p:clrMapOvr>
-  <mc:AlternateContent xmlns:mc="http://schemas.openxmlformats.org/markup-compatibility/2006">
-    <mc:Choice xmlns:p14="http://schemas.microsoft.com/office/powerpoint/2010/main" Requires="p14">
-      <p:transition spd="slow" p14:dur="2000"/>
-    </mc:Choice>
-    <mc:Fallback>
-      <p:transition spd="slow"/>
-    </mc:Fallback>
-  </mc:AlternateContent>
 </p:sldLayout>
 </file>
 
@@ -1718,10 +1697,9 @@
           <a:lstStyle/>
           <a:p>
             <a:r>
-              <a:rPr lang="en-US" smtClean="0"/>
+              <a:rPr lang="en-US"/>
               <a:t>Click to edit Master title style</a:t>
             </a:r>
-            <a:endParaRPr lang="en-US"/>
           </a:p>
         </p:txBody>
       </p:sp>
@@ -1837,10 +1815,9 @@
           </a:lstStyle>
           <a:p>
             <a:r>
-              <a:rPr lang="en-US" smtClean="0"/>
+              <a:rPr lang="en-US"/>
               <a:t>Click to edit Master subtitle style</a:t>
             </a:r>
-            <a:endParaRPr lang="en-US"/>
           </a:p>
         </p:txBody>
       </p:sp>
@@ -1861,6 +1838,7 @@
           <a:p>
             <a:fld id="{63937D59-5EDB-4C39-B697-625748F703B6}" type="datetimeFigureOut">
               <a:rPr lang="en-US" smtClean="0"/>
+              <a:t>10/3/2023</a:t>
             </a:fld>
             <a:endParaRPr lang="en-US"/>
           </a:p>
@@ -1902,6 +1880,7 @@
           <a:p>
             <a:fld id="{0F31DC1F-5561-484E-AB46-68C682854F61}" type="slidenum">
               <a:rPr lang="en-US" smtClean="0"/>
+              <a:t>‹#›</a:t>
             </a:fld>
             <a:endParaRPr lang="en-US"/>
           </a:p>
@@ -1948,10 +1927,9 @@
           <a:lstStyle/>
           <a:p>
             <a:r>
-              <a:rPr lang="en-US" smtClean="0"/>
+              <a:rPr lang="en-US"/>
               <a:t>Click to edit Master title style</a:t>
             </a:r>
-            <a:endParaRPr lang="en-US"/>
           </a:p>
         </p:txBody>
       </p:sp>
@@ -1972,42 +1950,37 @@
           <a:p>
             <a:pPr lvl="0"/>
             <a:r>
-              <a:rPr lang="en-US" smtClean="0"/>
+              <a:rPr lang="en-US"/>
               <a:t>Click to edit Master text styles</a:t>
             </a:r>
-            <a:endParaRPr lang="en-US" smtClean="0"/>
           </a:p>
           <a:p>
             <a:pPr lvl="1"/>
             <a:r>
-              <a:rPr lang="en-US" smtClean="0"/>
+              <a:rPr lang="en-US"/>
               <a:t>Second level</a:t>
             </a:r>
-            <a:endParaRPr lang="en-US" smtClean="0"/>
           </a:p>
           <a:p>
             <a:pPr lvl="2"/>
             <a:r>
-              <a:rPr lang="en-US" smtClean="0"/>
+              <a:rPr lang="en-US"/>
               <a:t>Third level</a:t>
             </a:r>
-            <a:endParaRPr lang="en-US" smtClean="0"/>
           </a:p>
           <a:p>
             <a:pPr lvl="3"/>
             <a:r>
-              <a:rPr lang="en-US" smtClean="0"/>
+              <a:rPr lang="en-US"/>
               <a:t>Fourth level</a:t>
             </a:r>
-            <a:endParaRPr lang="en-US" smtClean="0"/>
           </a:p>
           <a:p>
             <a:pPr lvl="4"/>
             <a:r>
-              <a:rPr lang="en-US" smtClean="0"/>
+              <a:rPr lang="en-US"/>
               <a:t>Fifth level</a:t>
             </a:r>
-            <a:endParaRPr lang="en-US"/>
           </a:p>
         </p:txBody>
       </p:sp>
@@ -2028,6 +2001,7 @@
           <a:p>
             <a:fld id="{63937D59-5EDB-4C39-B697-625748F703B6}" type="datetimeFigureOut">
               <a:rPr lang="en-US" smtClean="0"/>
+              <a:t>10/3/2023</a:t>
             </a:fld>
             <a:endParaRPr lang="en-US"/>
           </a:p>
@@ -2069,6 +2043,7 @@
           <a:p>
             <a:fld id="{0F31DC1F-5561-484E-AB46-68C682854F61}" type="slidenum">
               <a:rPr lang="en-US" smtClean="0"/>
+              <a:t>‹#›</a:t>
             </a:fld>
             <a:endParaRPr lang="en-US"/>
           </a:p>
@@ -2124,10 +2099,9 @@
           </a:lstStyle>
           <a:p>
             <a:r>
-              <a:rPr lang="en-US" smtClean="0"/>
+              <a:rPr lang="en-US"/>
               <a:t>Click to edit Master title style</a:t>
             </a:r>
-            <a:endParaRPr lang="en-US"/>
           </a:p>
         </p:txBody>
       </p:sp>
@@ -2244,10 +2218,9 @@
           <a:p>
             <a:pPr lvl="0"/>
             <a:r>
-              <a:rPr lang="en-US" smtClean="0"/>
+              <a:rPr lang="en-US"/>
               <a:t>Click to edit Master text styles</a:t>
             </a:r>
-            <a:endParaRPr lang="en-US" smtClean="0"/>
           </a:p>
         </p:txBody>
       </p:sp>
@@ -2268,6 +2241,7 @@
           <a:p>
             <a:fld id="{63937D59-5EDB-4C39-B697-625748F703B6}" type="datetimeFigureOut">
               <a:rPr lang="en-US" smtClean="0"/>
+              <a:t>10/3/2023</a:t>
             </a:fld>
             <a:endParaRPr lang="en-US"/>
           </a:p>
@@ -2309,6 +2283,7 @@
           <a:p>
             <a:fld id="{0F31DC1F-5561-484E-AB46-68C682854F61}" type="slidenum">
               <a:rPr lang="en-US" smtClean="0"/>
+              <a:t>‹#›</a:t>
             </a:fld>
             <a:endParaRPr lang="en-US"/>
           </a:p>
@@ -2355,10 +2330,9 @@
           <a:lstStyle/>
           <a:p>
             <a:r>
-              <a:rPr lang="en-US" smtClean="0"/>
+              <a:rPr lang="en-US"/>
               <a:t>Click to edit Master title style</a:t>
             </a:r>
-            <a:endParaRPr lang="en-US"/>
           </a:p>
         </p:txBody>
       </p:sp>
@@ -2412,42 +2386,37 @@
           <a:p>
             <a:pPr lvl="0"/>
             <a:r>
-              <a:rPr lang="en-US" smtClean="0"/>
+              <a:rPr lang="en-US"/>
               <a:t>Click to edit Master text styles</a:t>
             </a:r>
-            <a:endParaRPr lang="en-US" smtClean="0"/>
           </a:p>
           <a:p>
             <a:pPr lvl="1"/>
             <a:r>
-              <a:rPr lang="en-US" smtClean="0"/>
+              <a:rPr lang="en-US"/>
               <a:t>Second level</a:t>
             </a:r>
-            <a:endParaRPr lang="en-US" smtClean="0"/>
           </a:p>
           <a:p>
             <a:pPr lvl="2"/>
             <a:r>
-              <a:rPr lang="en-US" smtClean="0"/>
+              <a:rPr lang="en-US"/>
               <a:t>Third level</a:t>
             </a:r>
-            <a:endParaRPr lang="en-US" smtClean="0"/>
           </a:p>
           <a:p>
             <a:pPr lvl="3"/>
             <a:r>
-              <a:rPr lang="en-US" smtClean="0"/>
+              <a:rPr lang="en-US"/>
               <a:t>Fourth level</a:t>
             </a:r>
-            <a:endParaRPr lang="en-US" smtClean="0"/>
           </a:p>
           <a:p>
             <a:pPr lvl="4"/>
             <a:r>
-              <a:rPr lang="en-US" smtClean="0"/>
+              <a:rPr lang="en-US"/>
               <a:t>Fifth level</a:t>
             </a:r>
-            <a:endParaRPr lang="en-US"/>
           </a:p>
         </p:txBody>
       </p:sp>
@@ -2501,42 +2470,37 @@
           <a:p>
             <a:pPr lvl="0"/>
             <a:r>
-              <a:rPr lang="en-US" smtClean="0"/>
+              <a:rPr lang="en-US"/>
               <a:t>Click to edit Master text styles</a:t>
             </a:r>
-            <a:endParaRPr lang="en-US" smtClean="0"/>
           </a:p>
           <a:p>
             <a:pPr lvl="1"/>
             <a:r>
-              <a:rPr lang="en-US" smtClean="0"/>
+              <a:rPr lang="en-US"/>
               <a:t>Second level</a:t>
             </a:r>
-            <a:endParaRPr lang="en-US" smtClean="0"/>
           </a:p>
           <a:p>
             <a:pPr lvl="2"/>
             <a:r>
-              <a:rPr lang="en-US" smtClean="0"/>
+              <a:rPr lang="en-US"/>
               <a:t>Third level</a:t>
             </a:r>
-            <a:endParaRPr lang="en-US" smtClean="0"/>
           </a:p>
           <a:p>
             <a:pPr lvl="3"/>
             <a:r>
-              <a:rPr lang="en-US" smtClean="0"/>
+              <a:rPr lang="en-US"/>
               <a:t>Fourth level</a:t>
             </a:r>
-            <a:endParaRPr lang="en-US" smtClean="0"/>
           </a:p>
           <a:p>
             <a:pPr lvl="4"/>
             <a:r>
-              <a:rPr lang="en-US" smtClean="0"/>
+              <a:rPr lang="en-US"/>
               <a:t>Fifth level</a:t>
             </a:r>
-            <a:endParaRPr lang="en-US"/>
           </a:p>
         </p:txBody>
       </p:sp>
@@ -2557,6 +2521,7 @@
           <a:p>
             <a:fld id="{63937D59-5EDB-4C39-B697-625748F703B6}" type="datetimeFigureOut">
               <a:rPr lang="en-US" smtClean="0"/>
+              <a:t>10/3/2023</a:t>
             </a:fld>
             <a:endParaRPr lang="en-US"/>
           </a:p>
@@ -2598,6 +2563,7 @@
           <a:p>
             <a:fld id="{0F31DC1F-5561-484E-AB46-68C682854F61}" type="slidenum">
               <a:rPr lang="en-US" smtClean="0"/>
+              <a:t>‹#›</a:t>
             </a:fld>
             <a:endParaRPr lang="en-US"/>
           </a:p>
@@ -2648,10 +2614,9 @@
           </a:lstStyle>
           <a:p>
             <a:r>
-              <a:rPr lang="en-US" smtClean="0"/>
+              <a:rPr lang="en-US"/>
               <a:t>Click to edit Master title style</a:t>
             </a:r>
-            <a:endParaRPr lang="en-US"/>
           </a:p>
         </p:txBody>
       </p:sp>
@@ -2714,10 +2679,9 @@
           <a:p>
             <a:pPr lvl="0"/>
             <a:r>
-              <a:rPr lang="en-US" smtClean="0"/>
+              <a:rPr lang="en-US"/>
               <a:t>Click to edit Master text styles</a:t>
             </a:r>
-            <a:endParaRPr lang="en-US" smtClean="0"/>
           </a:p>
         </p:txBody>
       </p:sp>
@@ -2771,42 +2735,37 @@
           <a:p>
             <a:pPr lvl="0"/>
             <a:r>
-              <a:rPr lang="en-US" smtClean="0"/>
+              <a:rPr lang="en-US"/>
               <a:t>Click to edit Master text styles</a:t>
             </a:r>
-            <a:endParaRPr lang="en-US" smtClean="0"/>
           </a:p>
           <a:p>
             <a:pPr lvl="1"/>
             <a:r>
-              <a:rPr lang="en-US" smtClean="0"/>
+              <a:rPr lang="en-US"/>
               <a:t>Second level</a:t>
             </a:r>
-            <a:endParaRPr lang="en-US" smtClean="0"/>
           </a:p>
           <a:p>
             <a:pPr lvl="2"/>
             <a:r>
-              <a:rPr lang="en-US" smtClean="0"/>
+              <a:rPr lang="en-US"/>
               <a:t>Third level</a:t>
             </a:r>
-            <a:endParaRPr lang="en-US" smtClean="0"/>
           </a:p>
           <a:p>
             <a:pPr lvl="3"/>
             <a:r>
-              <a:rPr lang="en-US" smtClean="0"/>
+              <a:rPr lang="en-US"/>
               <a:t>Fourth level</a:t>
             </a:r>
-            <a:endParaRPr lang="en-US" smtClean="0"/>
           </a:p>
           <a:p>
             <a:pPr lvl="4"/>
             <a:r>
-              <a:rPr lang="en-US" smtClean="0"/>
+              <a:rPr lang="en-US"/>
               <a:t>Fifth level</a:t>
             </a:r>
-            <a:endParaRPr lang="en-US"/>
           </a:p>
         </p:txBody>
       </p:sp>
@@ -2869,10 +2828,9 @@
           <a:p>
             <a:pPr lvl="0"/>
             <a:r>
-              <a:rPr lang="en-US" smtClean="0"/>
+              <a:rPr lang="en-US"/>
               <a:t>Click to edit Master text styles</a:t>
             </a:r>
-            <a:endParaRPr lang="en-US" smtClean="0"/>
           </a:p>
         </p:txBody>
       </p:sp>
@@ -2926,42 +2884,37 @@
           <a:p>
             <a:pPr lvl="0"/>
             <a:r>
-              <a:rPr lang="en-US" smtClean="0"/>
+              <a:rPr lang="en-US"/>
               <a:t>Click to edit Master text styles</a:t>
             </a:r>
-            <a:endParaRPr lang="en-US" smtClean="0"/>
           </a:p>
           <a:p>
             <a:pPr lvl="1"/>
             <a:r>
-              <a:rPr lang="en-US" smtClean="0"/>
+              <a:rPr lang="en-US"/>
               <a:t>Second level</a:t>
             </a:r>
-            <a:endParaRPr lang="en-US" smtClean="0"/>
           </a:p>
           <a:p>
             <a:pPr lvl="2"/>
             <a:r>
-              <a:rPr lang="en-US" smtClean="0"/>
+              <a:rPr lang="en-US"/>
               <a:t>Third level</a:t>
             </a:r>
-            <a:endParaRPr lang="en-US" smtClean="0"/>
           </a:p>
           <a:p>
             <a:pPr lvl="3"/>
             <a:r>
-              <a:rPr lang="en-US" smtClean="0"/>
+              <a:rPr lang="en-US"/>
               <a:t>Fourth level</a:t>
             </a:r>
-            <a:endParaRPr lang="en-US" smtClean="0"/>
           </a:p>
           <a:p>
             <a:pPr lvl="4"/>
             <a:r>
-              <a:rPr lang="en-US" smtClean="0"/>
+              <a:rPr lang="en-US"/>
               <a:t>Fifth level</a:t>
             </a:r>
-            <a:endParaRPr lang="en-US"/>
           </a:p>
         </p:txBody>
       </p:sp>
@@ -2982,6 +2935,7 @@
           <a:p>
             <a:fld id="{63937D59-5EDB-4C39-B697-625748F703B6}" type="datetimeFigureOut">
               <a:rPr lang="en-US" smtClean="0"/>
+              <a:t>10/3/2023</a:t>
             </a:fld>
             <a:endParaRPr lang="en-US"/>
           </a:p>
@@ -3023,6 +2977,7 @@
           <a:p>
             <a:fld id="{0F31DC1F-5561-484E-AB46-68C682854F61}" type="slidenum">
               <a:rPr lang="en-US" smtClean="0"/>
+              <a:t>‹#›</a:t>
             </a:fld>
             <a:endParaRPr lang="en-US"/>
           </a:p>
@@ -3069,10 +3024,9 @@
           <a:lstStyle/>
           <a:p>
             <a:r>
-              <a:rPr lang="en-US" smtClean="0"/>
+              <a:rPr lang="en-US"/>
               <a:t>Click to edit Master title style</a:t>
             </a:r>
-            <a:endParaRPr lang="en-US"/>
           </a:p>
         </p:txBody>
       </p:sp>
@@ -3093,6 +3047,7 @@
           <a:p>
             <a:fld id="{63937D59-5EDB-4C39-B697-625748F703B6}" type="datetimeFigureOut">
               <a:rPr lang="en-US" smtClean="0"/>
+              <a:t>10/3/2023</a:t>
             </a:fld>
             <a:endParaRPr lang="en-US"/>
           </a:p>
@@ -3134,6 +3089,7 @@
           <a:p>
             <a:fld id="{0F31DC1F-5561-484E-AB46-68C682854F61}" type="slidenum">
               <a:rPr lang="en-US" smtClean="0"/>
+              <a:t>‹#›</a:t>
             </a:fld>
             <a:endParaRPr lang="en-US"/>
           </a:p>
@@ -3148,13 +3104,14 @@
 </file>
 
 <file path=ppt/slideMasters/slideMaster1.xml><?xml version="1.0" encoding="utf-8"?>
-<p:sldMaster xmlns:a="http://schemas.openxmlformats.org/drawingml/2006/main" xmlns:r="http://schemas.openxmlformats.org/officeDocument/2006/relationships" xmlns:p="http://schemas.openxmlformats.org/presentationml/2006/main" xmlns:p14="http://schemas.microsoft.com/office/powerpoint/2010/main">
+<p:sldMaster xmlns:a="http://schemas.openxmlformats.org/drawingml/2006/main" xmlns:r="http://schemas.openxmlformats.org/officeDocument/2006/relationships" xmlns:p="http://schemas.openxmlformats.org/presentationml/2006/main">
   <p:cSld>
     <p:bg>
       <p:bgPr>
         <a:solidFill>
           <a:schemeClr val="bg1"/>
         </a:solidFill>
+        <a:effectLst/>
       </p:bgPr>
     </p:bg>
     <p:spTree>
@@ -3179,21 +3136,6 @@
     <p:sldLayoutId id="2147483675" r:id="rId2"/>
     <p:sldLayoutId id="2147483676" r:id="rId3"/>
   </p:sldLayoutIdLst>
-  <mc:AlternateContent xmlns:mc="http://schemas.openxmlformats.org/markup-compatibility/2006">
-    <mc:Choice xmlns:p14="http://schemas.microsoft.com/office/powerpoint/2010/main" Requires="p14">
-      <p:transition spd="slow" p14:dur="2000"/>
-    </mc:Choice>
-    <mc:Fallback>
-      <p:transition spd="slow"/>
-    </mc:Fallback>
-  </mc:AlternateContent>
-  <p:timing>
-    <p:tnLst>
-      <p:par>
-        <p:cTn id="1" dur="indefinite" restart="never" nodeType="tmRoot"/>
-      </p:par>
-    </p:tnLst>
-  </p:timing>
   <p:txStyles>
     <p:titleStyle>
       <a:lvl1pPr algn="ctr" defTabSz="914400" rtl="0" eaLnBrk="1" latinLnBrk="1" hangingPunct="1">
@@ -3495,10 +3437,9 @@
           <a:lstStyle/>
           <a:p>
             <a:r>
-              <a:rPr lang="en-US" smtClean="0"/>
+              <a:rPr lang="en-US"/>
               <a:t>Click to edit Master title style</a:t>
             </a:r>
-            <a:endParaRPr lang="en-US"/>
           </a:p>
         </p:txBody>
       </p:sp>
@@ -3529,42 +3470,37 @@
           <a:p>
             <a:pPr lvl="0"/>
             <a:r>
-              <a:rPr lang="en-US" smtClean="0"/>
+              <a:rPr lang="en-US"/>
               <a:t>Click to edit Master text styles</a:t>
             </a:r>
-            <a:endParaRPr lang="en-US" smtClean="0"/>
           </a:p>
           <a:p>
             <a:pPr lvl="1"/>
             <a:r>
-              <a:rPr lang="en-US" smtClean="0"/>
+              <a:rPr lang="en-US"/>
               <a:t>Second level</a:t>
             </a:r>
-            <a:endParaRPr lang="en-US" smtClean="0"/>
           </a:p>
           <a:p>
             <a:pPr lvl="2"/>
             <a:r>
-              <a:rPr lang="en-US" smtClean="0"/>
+              <a:rPr lang="en-US"/>
               <a:t>Third level</a:t>
             </a:r>
-            <a:endParaRPr lang="en-US" smtClean="0"/>
           </a:p>
           <a:p>
             <a:pPr lvl="3"/>
             <a:r>
-              <a:rPr lang="en-US" smtClean="0"/>
+              <a:rPr lang="en-US"/>
               <a:t>Fourth level</a:t>
             </a:r>
-            <a:endParaRPr lang="en-US" smtClean="0"/>
           </a:p>
           <a:p>
             <a:pPr lvl="4"/>
             <a:r>
-              <a:rPr lang="en-US" smtClean="0"/>
+              <a:rPr lang="en-US"/>
               <a:t>Fifth level</a:t>
             </a:r>
-            <a:endParaRPr lang="en-US"/>
           </a:p>
         </p:txBody>
       </p:sp>
@@ -3603,6 +3539,7 @@
           <a:p>
             <a:fld id="{63937D59-5EDB-4C39-B697-625748F703B6}" type="datetimeFigureOut">
               <a:rPr lang="en-US" smtClean="0"/>
+              <a:t>10/3/2023</a:t>
             </a:fld>
             <a:endParaRPr lang="en-US"/>
           </a:p>
@@ -3680,6 +3617,7 @@
           <a:p>
             <a:fld id="{0F31DC1F-5561-484E-AB46-68C682854F61}" type="slidenum">
               <a:rPr lang="en-US" smtClean="0"/>
+              <a:t>‹#›</a:t>
             </a:fld>
             <a:endParaRPr lang="en-US"/>
           </a:p>
@@ -3955,7 +3893,7 @@
 </file>
 
 <file path=ppt/slides/slide1.xml><?xml version="1.0" encoding="utf-8"?>
-<p:sld xmlns:a="http://schemas.openxmlformats.org/drawingml/2006/main" xmlns:r="http://schemas.openxmlformats.org/officeDocument/2006/relationships" xmlns:p="http://schemas.openxmlformats.org/presentationml/2006/main" xmlns:p14="http://schemas.microsoft.com/office/powerpoint/2010/main">
+<p:sld xmlns:a="http://schemas.openxmlformats.org/drawingml/2006/main" xmlns:r="http://schemas.openxmlformats.org/officeDocument/2006/relationships" xmlns:p="http://schemas.openxmlformats.org/presentationml/2006/main">
   <p:cSld>
     <p:spTree>
       <p:nvGrpSpPr>
@@ -4003,7 +3941,7 @@
               <a:defRPr/>
             </a:pPr>
             <a:r>
-              <a:rPr kumimoji="0" lang="ko-KR" altLang="en-US" sz="1000" b="1" dirty="0" smtClean="0">
+              <a:rPr kumimoji="0" lang="ko-KR" altLang="en-US" sz="1000" b="1" dirty="0">
                 <a:solidFill>
                   <a:schemeClr val="bg1"/>
                 </a:solidFill>
@@ -4013,7 +3951,7 @@
               <a:t>그래픽</a:t>
             </a:r>
             <a:r>
-              <a:rPr kumimoji="0" lang="en-US" altLang="ko-KR" sz="1000" b="1" dirty="0" smtClean="0">
+              <a:rPr kumimoji="0" lang="en-US" altLang="ko-KR" sz="1000" b="1" dirty="0">
                 <a:solidFill>
                   <a:schemeClr val="bg1"/>
                 </a:solidFill>
@@ -4023,7 +3961,7 @@
               <a:t> </a:t>
             </a:r>
             <a:r>
-              <a:rPr kumimoji="0" lang="ko-KR" altLang="en-US" sz="1000" b="1" dirty="0" smtClean="0">
+              <a:rPr kumimoji="0" lang="ko-KR" altLang="en-US" sz="1000" b="1" dirty="0">
                 <a:solidFill>
                   <a:schemeClr val="bg1"/>
                 </a:solidFill>
@@ -4033,7 +3971,7 @@
               <a:t>품질과</a:t>
             </a:r>
             <a:r>
-              <a:rPr kumimoji="0" lang="en-US" altLang="ko-KR" sz="1000" b="1" dirty="0" smtClean="0">
+              <a:rPr kumimoji="0" lang="en-US" altLang="ko-KR" sz="1000" b="1" dirty="0">
                 <a:solidFill>
                   <a:schemeClr val="bg1"/>
                 </a:solidFill>
@@ -4043,7 +3981,7 @@
               <a:t> </a:t>
             </a:r>
             <a:r>
-              <a:rPr kumimoji="0" lang="ko-KR" altLang="en-US" sz="1000" b="1" dirty="0" smtClean="0">
+              <a:rPr kumimoji="0" lang="ko-KR" altLang="en-US" sz="1000" b="1" dirty="0">
                 <a:solidFill>
                   <a:schemeClr val="bg1"/>
                 </a:solidFill>
@@ -4053,7 +3991,7 @@
               <a:t>성능</a:t>
             </a:r>
             <a:r>
-              <a:rPr kumimoji="0" lang="en-US" altLang="ko-KR" sz="1000" b="1" dirty="0" smtClean="0">
+              <a:rPr kumimoji="0" lang="en-US" altLang="ko-KR" sz="1000" b="1" dirty="0">
                 <a:solidFill>
                   <a:schemeClr val="bg1"/>
                 </a:solidFill>
@@ -4063,7 +4001,7 @@
               <a:t> </a:t>
             </a:r>
             <a:r>
-              <a:rPr kumimoji="0" lang="ko-KR" altLang="en-US" sz="1000" b="1" dirty="0" smtClean="0">
+              <a:rPr kumimoji="0" lang="ko-KR" altLang="en-US" sz="1000" b="1" dirty="0">
                 <a:solidFill>
                   <a:schemeClr val="bg1"/>
                 </a:solidFill>
@@ -4073,7 +4011,7 @@
               <a:t>개선하기</a:t>
             </a:r>
             <a:r>
-              <a:rPr kumimoji="0" lang="en-US" altLang="ko-KR" sz="1000" b="1" dirty="0" smtClean="0">
+              <a:rPr kumimoji="0" lang="en-US" altLang="ko-KR" sz="1000" b="1" dirty="0">
                 <a:solidFill>
                   <a:schemeClr val="bg1"/>
                 </a:solidFill>
@@ -4082,13 +4020,6 @@
               </a:rPr>
               <a:t>   </a:t>
             </a:r>
-            <a:endParaRPr kumimoji="0" lang="en-US" altLang="ko-KR" sz="1000" b="1" dirty="0">
-              <a:solidFill>
-                <a:schemeClr val="bg1"/>
-              </a:solidFill>
-              <a:latin typeface="Arial" panose="020B0604020202020204" pitchFamily="34" charset="0"/>
-              <a:cs typeface="Arial" panose="020B0604020202020204" pitchFamily="34" charset="0"/>
-            </a:endParaRPr>
           </a:p>
         </p:txBody>
       </p:sp>
@@ -4121,7 +4052,7 @@
           <a:lstStyle/>
           <a:p>
             <a:r>
-              <a:rPr lang="en-US" altLang="ko-KR" sz="3200" b="1" dirty="0" smtClean="0">
+              <a:rPr lang="en-US" altLang="ko-KR" sz="3200" b="1" dirty="0">
                 <a:solidFill>
                   <a:schemeClr val="bg1"/>
                 </a:solidFill>
@@ -4131,18 +4062,10 @@
               </a:rPr>
               <a:t>Aliasing </a:t>
             </a:r>
-            <a:endParaRPr lang="en-US" altLang="ko-KR" sz="3200" b="1" dirty="0" smtClean="0">
-              <a:solidFill>
-                <a:schemeClr val="bg1"/>
-              </a:solidFill>
-              <a:latin typeface="Arial" panose="020B0604020202020204" pitchFamily="34" charset="0"/>
-              <a:ea typeface="Malgun Gothic" pitchFamily="50" charset="-127"/>
-              <a:cs typeface="Arial" panose="020B0604020202020204" pitchFamily="34" charset="0"/>
-            </a:endParaRPr>
-          </a:p>
-          <a:p>
-            <a:r>
-              <a:rPr lang="ko-KR" altLang="en-US" sz="3200" b="1" dirty="0" smtClean="0">
+          </a:p>
+          <a:p>
+            <a:r>
+              <a:rPr lang="ko-KR" altLang="en-US" sz="3200" b="1" dirty="0">
                 <a:solidFill>
                   <a:schemeClr val="bg1"/>
                 </a:solidFill>
@@ -4153,7 +4076,7 @@
               <a:t>개선</a:t>
             </a:r>
             <a:r>
-              <a:rPr lang="en-US" altLang="ko-KR" sz="3200" b="1" dirty="0" smtClean="0">
+              <a:rPr lang="en-US" altLang="ko-KR" sz="3200" b="1" dirty="0">
                 <a:solidFill>
                   <a:schemeClr val="bg1"/>
                 </a:solidFill>
@@ -4164,7 +4087,7 @@
               <a:t> </a:t>
             </a:r>
             <a:r>
-              <a:rPr lang="ko-KR" altLang="en-US" sz="3200" b="1" dirty="0" smtClean="0">
+              <a:rPr lang="ko-KR" altLang="en-US" sz="3200" b="1" dirty="0">
                 <a:solidFill>
                   <a:schemeClr val="bg1"/>
                 </a:solidFill>
@@ -4174,7 +4097,7 @@
               </a:rPr>
               <a:t>프로젝트</a:t>
             </a:r>
-            <a:endParaRPr lang="en-US" altLang="ko-KR" sz="3200" b="1" dirty="0" smtClean="0">
+            <a:endParaRPr lang="en-US" altLang="ko-KR" sz="3200" b="1" dirty="0">
               <a:solidFill>
                 <a:schemeClr val="bg1"/>
               </a:solidFill>
@@ -4219,15 +4142,6 @@
               </a:rPr>
               <a:t>이우진</a:t>
             </a:r>
-            <a:endParaRPr lang="ko-KR" altLang="en-US" sz="1200" dirty="0">
-              <a:solidFill>
-                <a:schemeClr val="bg1">
-                  <a:lumMod val="95000"/>
-                </a:schemeClr>
-              </a:solidFill>
-              <a:latin typeface="Arial" panose="020B0604020202020204" pitchFamily="34" charset="0"/>
-              <a:cs typeface="Arial" panose="020B0604020202020204" pitchFamily="34" charset="0"/>
-            </a:endParaRPr>
           </a:p>
           <a:p>
             <a:pPr algn="r"/>
@@ -4243,15 +4157,6 @@
               </a:rPr>
               <a:t>강윤수</a:t>
             </a:r>
-            <a:endParaRPr lang="ko-KR" altLang="en-US" sz="1200" dirty="0">
-              <a:solidFill>
-                <a:schemeClr val="bg1">
-                  <a:lumMod val="95000"/>
-                </a:schemeClr>
-              </a:solidFill>
-              <a:latin typeface="Arial" panose="020B0604020202020204" pitchFamily="34" charset="0"/>
-              <a:cs typeface="Arial" panose="020B0604020202020204" pitchFamily="34" charset="0"/>
-            </a:endParaRPr>
           </a:p>
           <a:p>
             <a:pPr algn="r"/>
@@ -4267,15 +4172,6 @@
               </a:rPr>
               <a:t>이수정</a:t>
             </a:r>
-            <a:endParaRPr lang="ko-KR" altLang="en-US" sz="1200" dirty="0">
-              <a:solidFill>
-                <a:schemeClr val="bg1">
-                  <a:lumMod val="95000"/>
-                </a:schemeClr>
-              </a:solidFill>
-              <a:latin typeface="Arial" panose="020B0604020202020204" pitchFamily="34" charset="0"/>
-              <a:cs typeface="Arial" panose="020B0604020202020204" pitchFamily="34" charset="0"/>
-            </a:endParaRPr>
           </a:p>
           <a:p>
             <a:pPr algn="r"/>
@@ -4308,26 +4204,11 @@
   <p:clrMapOvr>
     <a:masterClrMapping/>
   </p:clrMapOvr>
-  <mc:AlternateContent xmlns:mc="http://schemas.openxmlformats.org/markup-compatibility/2006">
-    <mc:Choice xmlns:p14="http://schemas.microsoft.com/office/powerpoint/2010/main" Requires="p14">
-      <p:transition spd="slow" p14:dur="2000"/>
-    </mc:Choice>
-    <mc:Fallback>
-      <p:transition spd="slow"/>
-    </mc:Fallback>
-  </mc:AlternateContent>
-  <p:timing>
-    <p:tnLst>
-      <p:par>
-        <p:cTn id="1" dur="indefinite" restart="never" nodeType="tmRoot"/>
-      </p:par>
-    </p:tnLst>
-  </p:timing>
 </p:sld>
 </file>
 
 <file path=ppt/slides/slide10.xml><?xml version="1.0" encoding="utf-8"?>
-<p:sld xmlns:a="http://schemas.openxmlformats.org/drawingml/2006/main" xmlns:r="http://schemas.openxmlformats.org/officeDocument/2006/relationships" xmlns:p="http://schemas.openxmlformats.org/presentationml/2006/main" xmlns:p14="http://schemas.microsoft.com/office/powerpoint/2010/main">
+<p:sld xmlns:a="http://schemas.openxmlformats.org/drawingml/2006/main" xmlns:r="http://schemas.openxmlformats.org/officeDocument/2006/relationships" xmlns:p="http://schemas.openxmlformats.org/presentationml/2006/main">
   <p:cSld>
     <p:spTree>
       <p:nvGrpSpPr>
@@ -4364,10 +4245,9 @@
           <a:lstStyle/>
           <a:p>
             <a:r>
-              <a:rPr lang="en-US" altLang="ko-KR" dirty="0" smtClean="0"/>
+              <a:rPr lang="en-US" altLang="ko-KR" dirty="0"/>
               <a:t> SMAA</a:t>
             </a:r>
-            <a:endParaRPr lang="en-US" altLang="ko-KR" dirty="0" smtClean="0"/>
           </a:p>
         </p:txBody>
       </p:sp>
@@ -4395,7 +4275,6 @@
               <a:rPr lang="en-US" altLang="ko-KR" b="1" dirty="0"/>
               <a:t>Enhanced Subpixel Morphological Anti Aliasing</a:t>
             </a:r>
-            <a:endParaRPr lang="en-US" altLang="ko-KR" b="1" dirty="0"/>
           </a:p>
         </p:txBody>
       </p:sp>
@@ -4426,10 +4305,6 @@
               </a:rPr>
               <a:t>MLAA의 또 다른 개선판</a:t>
             </a:r>
-            <a:endParaRPr dirty="0">
-              <a:latin typeface="Arial" panose="020B0604020202020204" pitchFamily="34" charset="0"/>
-              <a:cs typeface="Arial" panose="020B0604020202020204" pitchFamily="34" charset="0"/>
-            </a:endParaRPr>
           </a:p>
           <a:p>
             <a:r>
@@ -4439,10 +4314,6 @@
               </a:rPr>
               <a:t>– Edge 판별, 대각선 처리, shape의 보존 등 전방위적으로 MLAA의 품질 개선 (그만큼 성능은 하락)</a:t>
             </a:r>
-            <a:endParaRPr dirty="0">
-              <a:latin typeface="Arial" panose="020B0604020202020204" pitchFamily="34" charset="0"/>
-              <a:cs typeface="Arial" panose="020B0604020202020204" pitchFamily="34" charset="0"/>
-            </a:endParaRPr>
           </a:p>
           <a:p>
             <a:r>
@@ -4452,41 +4323,12 @@
               </a:rPr>
               <a:t>– Temporal super-sampling 및 MSAA와의 결합도 가능</a:t>
             </a:r>
-            <a:endParaRPr dirty="0">
-              <a:latin typeface="Arial" panose="020B0604020202020204" pitchFamily="34" charset="0"/>
-              <a:cs typeface="Arial" panose="020B0604020202020204" pitchFamily="34" charset="0"/>
-            </a:endParaRPr>
           </a:p>
         </p:txBody>
       </p:sp>
       <p:pic>
         <p:nvPicPr>
           <p:cNvPr id="4" name="Picture 3"/>
-          <p:cNvPicPr>
-            <a:picLocks noChangeAspect="1"/>
-          </p:cNvPicPr>
-          <p:nvPr/>
-        </p:nvPicPr>
-        <p:blipFill>
-          <a:blip r:embed="rId1"/>
-          <a:srcRect/>
-          <a:stretch>
-            <a:fillRect/>
-          </a:stretch>
-        </p:blipFill>
-        <p:spPr>
-          <a:xfrm>
-            <a:off x="2579370" y="2211070"/>
-            <a:ext cx="2294890" cy="2379345"/>
-          </a:xfrm>
-          <a:prstGeom prst="rect">
-            <a:avLst/>
-          </a:prstGeom>
-        </p:spPr>
-      </p:pic>
-      <p:pic>
-        <p:nvPicPr>
-          <p:cNvPr id="6" name="Picture 5"/>
           <p:cNvPicPr>
             <a:picLocks noChangeAspect="1"/>
           </p:cNvPicPr>
@@ -4501,6 +4343,31 @@
         </p:blipFill>
         <p:spPr>
           <a:xfrm>
+            <a:off x="2579370" y="2211070"/>
+            <a:ext cx="2294890" cy="2379345"/>
+          </a:xfrm>
+          <a:prstGeom prst="rect">
+            <a:avLst/>
+          </a:prstGeom>
+        </p:spPr>
+      </p:pic>
+      <p:pic>
+        <p:nvPicPr>
+          <p:cNvPr id="6" name="Picture 5"/>
+          <p:cNvPicPr>
+            <a:picLocks noChangeAspect="1"/>
+          </p:cNvPicPr>
+          <p:nvPr/>
+        </p:nvPicPr>
+        <p:blipFill>
+          <a:blip r:embed="rId3"/>
+          <a:srcRect/>
+          <a:stretch>
+            <a:fillRect/>
+          </a:stretch>
+        </p:blipFill>
+        <p:spPr>
+          <a:xfrm>
             <a:off x="5816600" y="2211070"/>
             <a:ext cx="2301875" cy="2379345"/>
           </a:xfrm>
@@ -4529,12 +4396,12 @@
           <a:bodyPr wrap="none" rtlCol="0">
             <a:spAutoFit/>
           </a:bodyPr>
+          <a:lstStyle/>
           <a:p>
             <a:r>
               <a:rPr lang="en-US"/>
               <a:t>Before</a:t>
             </a:r>
-            <a:endParaRPr lang="en-US"/>
           </a:p>
         </p:txBody>
       </p:sp>
@@ -4558,12 +4425,12 @@
           <a:bodyPr wrap="none" rtlCol="0">
             <a:spAutoFit/>
           </a:bodyPr>
+          <a:lstStyle/>
           <a:p>
             <a:r>
               <a:rPr lang="en-US"/>
               <a:t>After - SMAA ULTRA</a:t>
             </a:r>
-            <a:endParaRPr lang="en-US"/>
           </a:p>
         </p:txBody>
       </p:sp>
@@ -4572,26 +4439,11 @@
   <p:clrMapOvr>
     <a:masterClrMapping/>
   </p:clrMapOvr>
-  <mc:AlternateContent xmlns:mc="http://schemas.openxmlformats.org/markup-compatibility/2006">
-    <mc:Choice xmlns:p14="http://schemas.microsoft.com/office/powerpoint/2010/main" Requires="p14">
-      <p:transition spd="slow" p14:dur="2000"/>
-    </mc:Choice>
-    <mc:Fallback>
-      <p:transition spd="slow"/>
-    </mc:Fallback>
-  </mc:AlternateContent>
-  <p:timing>
-    <p:tnLst>
-      <p:par>
-        <p:cTn id="1" dur="indefinite" restart="never" nodeType="tmRoot"/>
-      </p:par>
-    </p:tnLst>
-  </p:timing>
 </p:sld>
 </file>
 
 <file path=ppt/slides/slide11.xml><?xml version="1.0" encoding="utf-8"?>
-<p:sld xmlns:a="http://schemas.openxmlformats.org/drawingml/2006/main" xmlns:r="http://schemas.openxmlformats.org/officeDocument/2006/relationships" xmlns:p="http://schemas.openxmlformats.org/presentationml/2006/main" xmlns:p14="http://schemas.microsoft.com/office/powerpoint/2010/main">
+<p:sld xmlns:a="http://schemas.openxmlformats.org/drawingml/2006/main" xmlns:r="http://schemas.openxmlformats.org/officeDocument/2006/relationships" xmlns:p="http://schemas.openxmlformats.org/presentationml/2006/main">
   <p:cSld>
     <p:spTree>
       <p:nvGrpSpPr>
@@ -4628,20 +4480,19 @@
           <a:lstStyle/>
           <a:p>
             <a:r>
-              <a:rPr lang="en-US" altLang="ko-KR" dirty="0" smtClean="0"/>
+              <a:rPr lang="en-US" altLang="ko-KR" dirty="0"/>
               <a:t> </a:t>
             </a:r>
             <a:r>
-              <a:rPr lang="en-US" altLang="ko-KR" dirty="0" smtClean="0">
+              <a:rPr lang="en-US" altLang="ko-KR" dirty="0">
                 <a:sym typeface="+mn-ea"/>
               </a:rPr>
               <a:t>SM</a:t>
             </a:r>
             <a:r>
-              <a:rPr lang="en-US" altLang="ko-KR" dirty="0" smtClean="0"/>
+              <a:rPr lang="en-US" altLang="ko-KR" dirty="0"/>
               <a:t>AA</a:t>
             </a:r>
-            <a:endParaRPr lang="en-US" altLang="ko-KR" dirty="0" smtClean="0"/>
           </a:p>
         </p:txBody>
       </p:sp>
@@ -4678,31 +4529,6 @@
       <p:pic>
         <p:nvPicPr>
           <p:cNvPr id="4" name="Picture 3"/>
-          <p:cNvPicPr>
-            <a:picLocks noChangeAspect="1"/>
-          </p:cNvPicPr>
-          <p:nvPr/>
-        </p:nvPicPr>
-        <p:blipFill>
-          <a:blip r:embed="rId1"/>
-          <a:srcRect/>
-          <a:stretch>
-            <a:fillRect/>
-          </a:stretch>
-        </p:blipFill>
-        <p:spPr>
-          <a:xfrm>
-            <a:off x="5161280" y="1062355"/>
-            <a:ext cx="1557020" cy="1614805"/>
-          </a:xfrm>
-          <a:prstGeom prst="rect">
-            <a:avLst/>
-          </a:prstGeom>
-        </p:spPr>
-      </p:pic>
-      <p:pic>
-        <p:nvPicPr>
-          <p:cNvPr id="6" name="Picture 5"/>
           <p:cNvPicPr>
             <a:picLocks noChangeAspect="1"/>
           </p:cNvPicPr>
@@ -4717,7 +4543,7 @@
         </p:blipFill>
         <p:spPr>
           <a:xfrm>
-            <a:off x="6894830" y="1062355"/>
+            <a:off x="5161280" y="1062355"/>
             <a:ext cx="1557020" cy="1614805"/>
           </a:xfrm>
           <a:prstGeom prst="rect">
@@ -4725,67 +4551,9 @@
           </a:prstGeom>
         </p:spPr>
       </p:pic>
-      <p:sp>
-        <p:nvSpPr>
-          <p:cNvPr id="7" name="Text Box 6"/>
-          <p:cNvSpPr txBox="1"/>
-          <p:nvPr/>
-        </p:nvSpPr>
-        <p:spPr>
-          <a:xfrm>
-            <a:off x="5601335" y="2754630"/>
-            <a:ext cx="586740" cy="368300"/>
-          </a:xfrm>
-          <a:prstGeom prst="rect">
-            <a:avLst/>
-          </a:prstGeom>
-          <a:noFill/>
-        </p:spPr>
-        <p:txBody>
-          <a:bodyPr wrap="none" rtlCol="0">
-            <a:spAutoFit/>
-          </a:bodyPr>
-          <a:p>
-            <a:r>
-              <a:rPr lang="en-US" altLang="ko-KR"/>
-              <a:t>Low</a:t>
-            </a:r>
-            <a:endParaRPr lang="en-US" altLang="ko-KR"/>
-          </a:p>
-        </p:txBody>
-      </p:sp>
-      <p:sp>
-        <p:nvSpPr>
-          <p:cNvPr id="8" name="Text Box 7"/>
-          <p:cNvSpPr txBox="1"/>
-          <p:nvPr/>
-        </p:nvSpPr>
-        <p:spPr>
-          <a:xfrm>
-            <a:off x="7152005" y="2754630"/>
-            <a:ext cx="960755" cy="368300"/>
-          </a:xfrm>
-          <a:prstGeom prst="rect">
-            <a:avLst/>
-          </a:prstGeom>
-          <a:noFill/>
-        </p:spPr>
-        <p:txBody>
-          <a:bodyPr wrap="none" rtlCol="0">
-            <a:spAutoFit/>
-          </a:bodyPr>
-          <a:p>
-            <a:r>
-              <a:rPr lang="en-US"/>
-              <a:t>Medium</a:t>
-            </a:r>
-            <a:endParaRPr lang="en-US"/>
-          </a:p>
-        </p:txBody>
-      </p:sp>
       <p:pic>
         <p:nvPicPr>
-          <p:cNvPr id="9" name="Picture 8"/>
+          <p:cNvPr id="6" name="Picture 5"/>
           <p:cNvPicPr>
             <a:picLocks noChangeAspect="1"/>
           </p:cNvPicPr>
@@ -4800,8 +4568,8 @@
         </p:blipFill>
         <p:spPr>
           <a:xfrm>
-            <a:off x="5171440" y="3125470"/>
-            <a:ext cx="1557655" cy="1609725"/>
+            <a:off x="6894830" y="1062355"/>
+            <a:ext cx="1557020" cy="1614805"/>
           </a:xfrm>
           <a:prstGeom prst="rect">
             <a:avLst/>
@@ -4810,14 +4578,14 @@
       </p:pic>
       <p:sp>
         <p:nvSpPr>
-          <p:cNvPr id="10" name="Text Box 9"/>
+          <p:cNvPr id="7" name="Text Box 6"/>
           <p:cNvSpPr txBox="1"/>
           <p:nvPr/>
         </p:nvSpPr>
         <p:spPr>
           <a:xfrm>
-            <a:off x="5644515" y="4815205"/>
-            <a:ext cx="625475" cy="368300"/>
+            <a:off x="5601335" y="2754630"/>
+            <a:ext cx="586740" cy="368300"/>
           </a:xfrm>
           <a:prstGeom prst="rect">
             <a:avLst/>
@@ -4828,18 +4596,47 @@
           <a:bodyPr wrap="none" rtlCol="0">
             <a:spAutoFit/>
           </a:bodyPr>
+          <a:lstStyle/>
+          <a:p>
+            <a:r>
+              <a:rPr lang="en-US" altLang="ko-KR"/>
+              <a:t>Low</a:t>
+            </a:r>
+          </a:p>
+        </p:txBody>
+      </p:sp>
+      <p:sp>
+        <p:nvSpPr>
+          <p:cNvPr id="8" name="Text Box 7"/>
+          <p:cNvSpPr txBox="1"/>
+          <p:nvPr/>
+        </p:nvSpPr>
+        <p:spPr>
+          <a:xfrm>
+            <a:off x="7152005" y="2754630"/>
+            <a:ext cx="960755" cy="368300"/>
+          </a:xfrm>
+          <a:prstGeom prst="rect">
+            <a:avLst/>
+          </a:prstGeom>
+          <a:noFill/>
+        </p:spPr>
+        <p:txBody>
+          <a:bodyPr wrap="none" rtlCol="0">
+            <a:spAutoFit/>
+          </a:bodyPr>
+          <a:lstStyle/>
           <a:p>
             <a:r>
               <a:rPr lang="en-US"/>
-              <a:t>High</a:t>
-            </a:r>
-            <a:endParaRPr lang="en-US"/>
+              <a:t>Medium</a:t>
+            </a:r>
           </a:p>
         </p:txBody>
       </p:sp>
       <p:pic>
         <p:nvPicPr>
-          <p:cNvPr id="16" name="Picture 15"/>
+          <p:cNvPr id="9" name="Picture 8"/>
           <p:cNvPicPr>
             <a:picLocks noChangeAspect="1"/>
           </p:cNvPicPr>
@@ -4854,8 +4651,8 @@
         </p:blipFill>
         <p:spPr>
           <a:xfrm>
-            <a:off x="6928485" y="3125470"/>
-            <a:ext cx="1557020" cy="1609725"/>
+            <a:off x="5171440" y="3125470"/>
+            <a:ext cx="1557655" cy="1609725"/>
           </a:xfrm>
           <a:prstGeom prst="rect">
             <a:avLst/>
@@ -4864,14 +4661,14 @@
       </p:pic>
       <p:sp>
         <p:nvSpPr>
-          <p:cNvPr id="17" name="Text Box 16"/>
+          <p:cNvPr id="10" name="Text Box 9"/>
           <p:cNvSpPr txBox="1"/>
           <p:nvPr/>
         </p:nvSpPr>
         <p:spPr>
           <a:xfrm>
-            <a:off x="7409180" y="4815205"/>
-            <a:ext cx="651510" cy="368300"/>
+            <a:off x="5644515" y="4815205"/>
+            <a:ext cx="625475" cy="368300"/>
           </a:xfrm>
           <a:prstGeom prst="rect">
             <a:avLst/>
@@ -4882,18 +4679,18 @@
           <a:bodyPr wrap="none" rtlCol="0">
             <a:spAutoFit/>
           </a:bodyPr>
+          <a:lstStyle/>
           <a:p>
             <a:r>
               <a:rPr lang="en-US"/>
-              <a:t>Ultra</a:t>
-            </a:r>
-            <a:endParaRPr lang="en-US"/>
+              <a:t>High</a:t>
+            </a:r>
           </a:p>
         </p:txBody>
       </p:sp>
       <p:pic>
         <p:nvPicPr>
-          <p:cNvPr id="18" name="Picture 17"/>
+          <p:cNvPr id="16" name="Picture 15"/>
           <p:cNvPicPr>
             <a:picLocks noChangeAspect="1"/>
           </p:cNvPicPr>
@@ -4908,8 +4705,8 @@
         </p:blipFill>
         <p:spPr>
           <a:xfrm>
-            <a:off x="1995170" y="1635760"/>
-            <a:ext cx="2294255" cy="2378710"/>
+            <a:off x="6928485" y="3125470"/>
+            <a:ext cx="1557020" cy="1609725"/>
           </a:xfrm>
           <a:prstGeom prst="rect">
             <a:avLst/>
@@ -4918,14 +4715,14 @@
       </p:pic>
       <p:sp>
         <p:nvSpPr>
-          <p:cNvPr id="19" name="Text Box 18"/>
+          <p:cNvPr id="17" name="Text Box 16"/>
           <p:cNvSpPr txBox="1"/>
           <p:nvPr/>
         </p:nvSpPr>
         <p:spPr>
           <a:xfrm>
-            <a:off x="2662555" y="4156075"/>
-            <a:ext cx="920750" cy="368300"/>
+            <a:off x="7409180" y="4815205"/>
+            <a:ext cx="651510" cy="368300"/>
           </a:xfrm>
           <a:prstGeom prst="rect">
             <a:avLst/>
@@ -4936,12 +4733,66 @@
           <a:bodyPr wrap="none" rtlCol="0">
             <a:spAutoFit/>
           </a:bodyPr>
+          <a:lstStyle/>
+          <a:p>
+            <a:r>
+              <a:rPr lang="en-US"/>
+              <a:t>Ultra</a:t>
+            </a:r>
+          </a:p>
+        </p:txBody>
+      </p:sp>
+      <p:pic>
+        <p:nvPicPr>
+          <p:cNvPr id="18" name="Picture 17"/>
+          <p:cNvPicPr>
+            <a:picLocks noChangeAspect="1"/>
+          </p:cNvPicPr>
+          <p:nvPr/>
+        </p:nvPicPr>
+        <p:blipFill>
+          <a:blip r:embed="rId6"/>
+          <a:srcRect/>
+          <a:stretch>
+            <a:fillRect/>
+          </a:stretch>
+        </p:blipFill>
+        <p:spPr>
+          <a:xfrm>
+            <a:off x="1995170" y="1635760"/>
+            <a:ext cx="2294255" cy="2378710"/>
+          </a:xfrm>
+          <a:prstGeom prst="rect">
+            <a:avLst/>
+          </a:prstGeom>
+        </p:spPr>
+      </p:pic>
+      <p:sp>
+        <p:nvSpPr>
+          <p:cNvPr id="19" name="Text Box 18"/>
+          <p:cNvSpPr txBox="1"/>
+          <p:nvPr/>
+        </p:nvSpPr>
+        <p:spPr>
+          <a:xfrm>
+            <a:off x="2662555" y="4156075"/>
+            <a:ext cx="920750" cy="368300"/>
+          </a:xfrm>
+          <a:prstGeom prst="rect">
+            <a:avLst/>
+          </a:prstGeom>
+          <a:noFill/>
+        </p:spPr>
+        <p:txBody>
+          <a:bodyPr wrap="none" rtlCol="0">
+            <a:spAutoFit/>
+          </a:bodyPr>
+          <a:lstStyle/>
           <a:p>
             <a:r>
               <a:rPr lang="en-US"/>
               <a:t>Original</a:t>
             </a:r>
-            <a:endParaRPr lang="en-US"/>
           </a:p>
         </p:txBody>
       </p:sp>
@@ -4950,26 +4801,11 @@
   <p:clrMapOvr>
     <a:masterClrMapping/>
   </p:clrMapOvr>
-  <mc:AlternateContent xmlns:mc="http://schemas.openxmlformats.org/markup-compatibility/2006">
-    <mc:Choice xmlns:p14="http://schemas.microsoft.com/office/powerpoint/2010/main" Requires="p14">
-      <p:transition spd="slow" p14:dur="2000"/>
-    </mc:Choice>
-    <mc:Fallback>
-      <p:transition spd="slow"/>
-    </mc:Fallback>
-  </mc:AlternateContent>
-  <p:timing>
-    <p:tnLst>
-      <p:par>
-        <p:cTn id="1" dur="indefinite" restart="never" nodeType="tmRoot"/>
-      </p:par>
-    </p:tnLst>
-  </p:timing>
 </p:sld>
 </file>
 
 <file path=ppt/slides/slide12.xml><?xml version="1.0" encoding="utf-8"?>
-<p:sld xmlns:a="http://schemas.openxmlformats.org/drawingml/2006/main" xmlns:r="http://schemas.openxmlformats.org/officeDocument/2006/relationships" xmlns:p="http://schemas.openxmlformats.org/presentationml/2006/main" xmlns:p14="http://schemas.microsoft.com/office/powerpoint/2010/main">
+<p:sld xmlns:a="http://schemas.openxmlformats.org/drawingml/2006/main" xmlns:r="http://schemas.openxmlformats.org/officeDocument/2006/relationships" xmlns:p="http://schemas.openxmlformats.org/presentationml/2006/main">
   <p:cSld>
     <p:spTree>
       <p:nvGrpSpPr>
@@ -5006,10 +4842,9 @@
           <a:lstStyle/>
           <a:p>
             <a:r>
-              <a:rPr lang="en-US" altLang="ko-KR" dirty="0" smtClean="0"/>
+              <a:rPr lang="en-US" altLang="ko-KR" dirty="0"/>
               <a:t> TAA</a:t>
             </a:r>
-            <a:endParaRPr lang="en-US" altLang="ko-KR" dirty="0" smtClean="0"/>
           </a:p>
         </p:txBody>
       </p:sp>
@@ -5037,7 +4872,6 @@
               <a:rPr lang="en-US" altLang="ko-KR" b="1" dirty="0"/>
               <a:t>Temporal Anti Aliasing</a:t>
             </a:r>
-            <a:endParaRPr lang="en-US" altLang="ko-KR" b="1" dirty="0"/>
           </a:p>
         </p:txBody>
       </p:sp>
@@ -5152,10 +4986,6 @@
               </a:rPr>
               <a:t>높은 품질의 안티앨리어싱 효과를 제공</a:t>
             </a:r>
-            <a:endParaRPr dirty="0">
-              <a:latin typeface="Arial" panose="020B0604020202020204" pitchFamily="34" charset="0"/>
-              <a:cs typeface="Arial" panose="020B0604020202020204" pitchFamily="34" charset="0"/>
-            </a:endParaRPr>
           </a:p>
           <a:p>
             <a:r>
@@ -5200,10 +5030,6 @@
               </a:rPr>
               <a:t>있음</a:t>
             </a:r>
-            <a:endParaRPr lang="ko-KR" altLang="en-US" dirty="0">
-              <a:latin typeface="Arial" panose="020B0604020202020204" pitchFamily="34" charset="0"/>
-              <a:cs typeface="Arial" panose="020B0604020202020204" pitchFamily="34" charset="0"/>
-            </a:endParaRPr>
           </a:p>
           <a:p>
             <a:r>
@@ -5234,41 +5060,12 @@
               </a:rPr>
               <a:t> 동적 이미지 모두에 적용 가능</a:t>
             </a:r>
-            <a:endParaRPr dirty="0">
-              <a:latin typeface="Arial" panose="020B0604020202020204" pitchFamily="34" charset="0"/>
-              <a:cs typeface="Arial" panose="020B0604020202020204" pitchFamily="34" charset="0"/>
-            </a:endParaRPr>
           </a:p>
         </p:txBody>
       </p:sp>
       <p:pic>
         <p:nvPicPr>
           <p:cNvPr id="4" name="Picture 3"/>
-          <p:cNvPicPr>
-            <a:picLocks noChangeAspect="1"/>
-          </p:cNvPicPr>
-          <p:nvPr/>
-        </p:nvPicPr>
-        <p:blipFill>
-          <a:blip r:embed="rId1"/>
-          <a:srcRect/>
-          <a:stretch>
-            <a:fillRect/>
-          </a:stretch>
-        </p:blipFill>
-        <p:spPr>
-          <a:xfrm>
-            <a:off x="2579370" y="2067560"/>
-            <a:ext cx="2294890" cy="2379345"/>
-          </a:xfrm>
-          <a:prstGeom prst="rect">
-            <a:avLst/>
-          </a:prstGeom>
-        </p:spPr>
-      </p:pic>
-      <p:pic>
-        <p:nvPicPr>
-          <p:cNvPr id="6" name="Picture 5"/>
           <p:cNvPicPr>
             <a:picLocks noChangeAspect="1"/>
           </p:cNvPicPr>
@@ -5283,14 +5080,39 @@
         </p:blipFill>
         <p:spPr>
           <a:xfrm>
-            <a:off x="5833110" y="2077085"/>
-            <a:ext cx="2268855" cy="2360930"/>
+            <a:off x="1773054" y="2067560"/>
+            <a:ext cx="2294890" cy="2379345"/>
           </a:xfrm>
           <a:prstGeom prst="rect">
             <a:avLst/>
           </a:prstGeom>
         </p:spPr>
       </p:pic>
+      <p:pic>
+        <p:nvPicPr>
+          <p:cNvPr id="6" name="Picture 5"/>
+          <p:cNvPicPr>
+            <a:picLocks noChangeAspect="1"/>
+          </p:cNvPicPr>
+          <p:nvPr/>
+        </p:nvPicPr>
+        <p:blipFill>
+          <a:blip r:embed="rId3"/>
+          <a:srcRect/>
+          <a:stretch>
+            <a:fillRect/>
+          </a:stretch>
+        </p:blipFill>
+        <p:spPr>
+          <a:xfrm>
+            <a:off x="4355976" y="2077085"/>
+            <a:ext cx="2268855" cy="2360930"/>
+          </a:xfrm>
+          <a:prstGeom prst="rect">
+            <a:avLst/>
+          </a:prstGeom>
+        </p:spPr>
+      </p:pic>
       <p:sp>
         <p:nvSpPr>
           <p:cNvPr id="7" name="Text Box 6"/>
@@ -5299,7 +5121,7 @@
         </p:nvSpPr>
         <p:spPr>
           <a:xfrm>
-            <a:off x="3204210" y="4659630"/>
+            <a:off x="2397894" y="4659630"/>
             <a:ext cx="820420" cy="368300"/>
           </a:xfrm>
           <a:prstGeom prst="rect">
@@ -5311,12 +5133,12 @@
           <a:bodyPr wrap="none" rtlCol="0">
             <a:spAutoFit/>
           </a:bodyPr>
-          <a:p>
-            <a:r>
-              <a:rPr lang="en-US"/>
+          <a:lstStyle/>
+          <a:p>
+            <a:r>
+              <a:rPr lang="en-US" dirty="0"/>
               <a:t>Before</a:t>
             </a:r>
-            <a:endParaRPr lang="en-US"/>
           </a:p>
         </p:txBody>
       </p:sp>
@@ -5328,8 +5150,8 @@
         </p:nvSpPr>
         <p:spPr>
           <a:xfrm>
-            <a:off x="6632575" y="4659630"/>
-            <a:ext cx="668655" cy="368300"/>
+            <a:off x="4644008" y="4659630"/>
+            <a:ext cx="1397049" cy="369332"/>
           </a:xfrm>
           <a:prstGeom prst="rect">
             <a:avLst/>
@@ -5340,12 +5162,82 @@
           <a:bodyPr wrap="none" rtlCol="0">
             <a:spAutoFit/>
           </a:bodyPr>
-          <a:p>
-            <a:r>
-              <a:rPr lang="en-US"/>
-              <a:t>After</a:t>
-            </a:r>
-            <a:endParaRPr lang="en-US"/>
+          <a:lstStyle/>
+          <a:p>
+            <a:r>
+              <a:rPr lang="en-US" dirty="0"/>
+              <a:t>SMAA+TAA</a:t>
+            </a:r>
+          </a:p>
+        </p:txBody>
+      </p:sp>
+      <p:pic>
+        <p:nvPicPr>
+          <p:cNvPr id="9" name="Picture 5">
+            <a:extLst>
+              <a:ext uri="{FF2B5EF4-FFF2-40B4-BE49-F238E27FC236}">
+                <a16:creationId xmlns:a16="http://schemas.microsoft.com/office/drawing/2014/main" id="{6B5F8FBA-EC55-49A7-1A94-8DF2CFCD546F}"/>
+              </a:ext>
+            </a:extLst>
+          </p:cNvPr>
+          <p:cNvPicPr>
+            <a:picLocks noChangeAspect="1"/>
+          </p:cNvPicPr>
+          <p:nvPr/>
+        </p:nvPicPr>
+        <p:blipFill>
+          <a:blip r:embed="rId4">
+            <a:extLst>
+              <a:ext uri="{28A0092B-C50C-407E-A947-70E740481C1C}">
+                <a14:useLocalDpi xmlns:a14="http://schemas.microsoft.com/office/drawing/2010/main" val="0"/>
+              </a:ext>
+            </a:extLst>
+          </a:blip>
+          <a:srcRect/>
+          <a:stretch/>
+        </p:blipFill>
+        <p:spPr>
+          <a:xfrm>
+            <a:off x="6771107" y="2067694"/>
+            <a:ext cx="2261923" cy="2360930"/>
+          </a:xfrm>
+          <a:prstGeom prst="rect">
+            <a:avLst/>
+          </a:prstGeom>
+        </p:spPr>
+      </p:pic>
+      <p:sp>
+        <p:nvSpPr>
+          <p:cNvPr id="10" name="Text Box 7">
+            <a:extLst>
+              <a:ext uri="{FF2B5EF4-FFF2-40B4-BE49-F238E27FC236}">
+                <a16:creationId xmlns:a16="http://schemas.microsoft.com/office/drawing/2014/main" id="{38857720-9932-EF49-DAEA-3E0A25DC2AB0}"/>
+              </a:ext>
+            </a:extLst>
+          </p:cNvPr>
+          <p:cNvSpPr txBox="1"/>
+          <p:nvPr/>
+        </p:nvSpPr>
+        <p:spPr>
+          <a:xfrm>
+            <a:off x="7092280" y="4650239"/>
+            <a:ext cx="1315296" cy="369332"/>
+          </a:xfrm>
+          <a:prstGeom prst="rect">
+            <a:avLst/>
+          </a:prstGeom>
+          <a:noFill/>
+        </p:spPr>
+        <p:txBody>
+          <a:bodyPr wrap="none" rtlCol="0">
+            <a:spAutoFit/>
+          </a:bodyPr>
+          <a:lstStyle/>
+          <a:p>
+            <a:r>
+              <a:rPr lang="en-US" dirty="0"/>
+              <a:t>FXAA+TAA</a:t>
+            </a:r>
           </a:p>
         </p:txBody>
       </p:sp>
@@ -5354,26 +5246,11 @@
   <p:clrMapOvr>
     <a:masterClrMapping/>
   </p:clrMapOvr>
-  <mc:AlternateContent xmlns:mc="http://schemas.openxmlformats.org/markup-compatibility/2006">
-    <mc:Choice xmlns:p14="http://schemas.microsoft.com/office/powerpoint/2010/main" Requires="p14">
-      <p:transition spd="slow" p14:dur="2000"/>
-    </mc:Choice>
-    <mc:Fallback>
-      <p:transition spd="slow"/>
-    </mc:Fallback>
-  </mc:AlternateContent>
-  <p:timing>
-    <p:tnLst>
-      <p:par>
-        <p:cTn id="1" dur="indefinite" restart="never" nodeType="tmRoot"/>
-      </p:par>
-    </p:tnLst>
-  </p:timing>
 </p:sld>
 </file>
 
 <file path=ppt/slides/slide13.xml><?xml version="1.0" encoding="utf-8"?>
-<p:sld xmlns:a="http://schemas.openxmlformats.org/drawingml/2006/main" xmlns:r="http://schemas.openxmlformats.org/officeDocument/2006/relationships" xmlns:p="http://schemas.openxmlformats.org/presentationml/2006/main" xmlns:p14="http://schemas.microsoft.com/office/powerpoint/2010/main">
+<p:sld xmlns:a="http://schemas.openxmlformats.org/drawingml/2006/main" xmlns:r="http://schemas.openxmlformats.org/officeDocument/2006/relationships" xmlns:p="http://schemas.openxmlformats.org/presentationml/2006/main">
   <p:cSld>
     <p:spTree>
       <p:nvGrpSpPr>
@@ -5410,22 +5287,22 @@
           <a:lstStyle/>
           <a:p>
             <a:r>
-              <a:rPr lang="en-US" altLang="ko-KR" dirty="0" smtClean="0"/>
+              <a:rPr lang="en-US" altLang="ko-KR" dirty="0"/>
               <a:t> </a:t>
             </a:r>
             <a:r>
-              <a:rPr lang="ko-KR" altLang="en-US" dirty="0" smtClean="0"/>
+              <a:rPr lang="ko-KR" altLang="en-US" dirty="0"/>
               <a:t>시연</a:t>
             </a:r>
             <a:r>
-              <a:rPr lang="en-US" altLang="ko-KR" dirty="0" smtClean="0"/>
+              <a:rPr lang="en-US" altLang="ko-KR" dirty="0"/>
               <a:t> </a:t>
             </a:r>
             <a:r>
-              <a:rPr lang="ko-KR" altLang="en-US" dirty="0" smtClean="0"/>
+              <a:rPr lang="ko-KR" altLang="en-US" dirty="0"/>
               <a:t>영상</a:t>
             </a:r>
-            <a:endParaRPr lang="en-US" altLang="ko-KR" dirty="0" smtClean="0"/>
+            <a:endParaRPr lang="en-US" altLang="ko-KR" dirty="0"/>
           </a:p>
         </p:txBody>
       </p:sp>
@@ -5438,11 +5315,13 @@
           <p:nvPr/>
         </p:nvSpPr>
         <p:spPr>
-          <a:xfrm rot="0">
+          <a:xfrm>
             <a:off x="2190115" y="1069340"/>
-            <a:ext cx="6570345" cy="647065"/>
-          </a:xfrm>
-          <a:prstGeom prst="rect"/>
+            <a:ext cx="6570345" cy="370614"/>
+          </a:xfrm>
+          <a:prstGeom prst="rect">
+            <a:avLst/>
+          </a:prstGeom>
           <a:noFill/>
           <a:ln>
             <a:noFill/>
@@ -5450,41 +5329,21 @@
           </a:ln>
         </p:spPr>
         <p:txBody>
-          <a:bodyPr wrap="square" lIns="89535" tIns="46355" rIns="89535" bIns="46355" vert="horz" anchor="t">
+          <a:bodyPr vert="horz" wrap="square" lIns="89535" tIns="46355" rIns="89535" bIns="46355" anchor="t">
             <a:spAutoFit/>
           </a:bodyPr>
           <a:lstStyle/>
           <a:p>
             <a:pPr marL="0" indent="0" algn="l" hangingPunct="1"/>
             <a:r>
-              <a:rPr sz="1800">
+              <a:rPr lang="en-US" sz="1800" dirty="0">
                 <a:latin typeface="맑은 고딕" charset="0"/>
                 <a:ea typeface="맑은 고딕" charset="0"/>
-                <a:hlinkClick r:id="rId5">
-                  <a:extLst>
-                    <a:ext uri="{A12FA001-AC4F-418D-AE19-62706E023703}">
-                      <ahyp:hlinkClr xmlns:ahyp="http://schemas.microsoft.com/office/drawing/2018/hyperlinkcolor" xmlns="" val="hlink"/>
-                    </a:ext>
-                  </a:extLst>
-                </a:hlinkClick>
-              </a:rPr>
-              <a:t>Youtube link</a:t>
-            </a:r>
-            <a:endParaRPr lang="ko-KR" altLang="en-US" sz="1800">
-              <a:latin typeface="맑은 고딕" charset="0"/>
-              <a:ea typeface="맑은 고딕" charset="0"/>
-            </a:endParaRPr>
-          </a:p>
-          <a:p>
-            <a:pPr marL="0" indent="0" algn="l" hangingPunct="1"/>
-            <a:r>
-              <a:rPr sz="1800">
-                <a:latin typeface="맑은 고딕" charset="0"/>
-                <a:ea typeface="맑은 고딕" charset="0"/>
-              </a:rPr>
-              <a:t>https://youtu.be/k-8TKMmAnfg?si=Wey7vVRyLNDd8VPl</a:t>
-            </a:r>
-            <a:endParaRPr lang="ko-KR" altLang="en-US" sz="1800">
+                <a:hlinkClick r:id="rId2"/>
+              </a:rPr>
+              <a:t>https://youtu.be/A-bdLFluJ6Y?si=paKcCyKogklsz5mb</a:t>
+            </a:r>
+            <a:endParaRPr lang="ko-KR" altLang="en-US" sz="1800" dirty="0">
               <a:latin typeface="맑은 고딕" charset="0"/>
               <a:ea typeface="맑은 고딕" charset="0"/>
             </a:endParaRPr>
@@ -5500,7 +5359,7 @@
           <p:nvPr/>
         </p:nvPicPr>
         <p:blipFill rotWithShape="1">
-          <a:blip r:embed="rId6" cstate="print">
+          <a:blip r:embed="rId3" cstate="print">
             <a:extLst>
               <a:ext uri="{28A0092B-C50C-407E-A947-70E740481C1C}">
                 <a14:useLocalDpi xmlns:a14="http://schemas.microsoft.com/office/drawing/2010/main" val="0"/>
@@ -5512,11 +5371,13 @@
           </a:stretch>
         </p:blipFill>
         <p:spPr>
-          <a:xfrm rot="0">
+          <a:xfrm>
             <a:off x="2190750" y="1844675"/>
             <a:ext cx="6096635" cy="3153410"/>
           </a:xfrm>
-          <a:prstGeom prst="rect"/>
+          <a:prstGeom prst="rect">
+            <a:avLst/>
+          </a:prstGeom>
           <a:noFill/>
         </p:spPr>
       </p:pic>
@@ -5525,87 +5386,11 @@
   <p:clrMapOvr>
     <a:masterClrMapping/>
   </p:clrMapOvr>
-  <mc:AlternateContent xmlns:mc="http://schemas.openxmlformats.org/markup-compatibility/2006">
-    <mc:Choice xmlns:p14="http://schemas.microsoft.com/office/powerpoint/2010/main" Requires="p14">
-      <p:transition spd="slow" p14:dur="2000"/>
-    </mc:Choice>
-    <mc:Fallback>
-      <p:transition spd="slow"/>
-    </mc:Fallback>
-  </mc:AlternateContent>
-  <p:timing>
-    <p:tnLst>
-      <p:par>
-        <p:cTn id="1" dur="indefinite" restart="never" nodeType="tmRoot">
-          <p:childTnLst>
-            <p:seq concurrent="1" nextAc="seek">
-              <p:cTn id="3" restart="whenNotActive" fill="hold" evtFilter="cancelBubble" nodeType="interactiveSeq">
-                <p:stCondLst>
-                  <p:cond evt="onClick" delay="0">
-                    <p:tgtEl>
-                      <p:spTgt spid="10"/>
-                    </p:tgtEl>
-                  </p:cond>
-                </p:stCondLst>
-                <p:endSync evt="end" delay="0">
-                  <p:rtn val="all"/>
-                </p:endSync>
-                <p:childTnLst>
-                  <p:par>
-                    <p:cTn id="4" fill="hold">
-                      <p:stCondLst>
-                        <p:cond delay="0"/>
-                      </p:stCondLst>
-                      <p:childTnLst>
-                        <p:par>
-                          <p:cTn id="5" fill="hold">
-                            <p:stCondLst>
-                              <p:cond delay="0"/>
-                            </p:stCondLst>
-                            <p:childTnLst>
-                              <p:par>
-                                <p:cTn id="6" presetID="2" presetClass="mediacall" presetSubtype="0" fill="hold" nodeType="clickEffect">
-                                  <p:stCondLst>
-                                    <p:cond delay="0"/>
-                                  </p:stCondLst>
-                                  <p:childTnLst>
-                                    <p:cmd type="call" cmd="togglePause">
-                                      <p:cBhvr additive="base">
-                                        <p:cTn id="7" dur="1" fill="hold"/>
-                                        <p:tgtEl>
-                                          <p:spTgt spid="10"/>
-                                        </p:tgtEl>
-                                      </p:cBhvr>
-                                    </p:cmd>
-                                  </p:childTnLst>
-                                </p:cTn>
-                              </p:par>
-                            </p:childTnLst>
-                          </p:cTn>
-                        </p:par>
-                      </p:childTnLst>
-                    </p:cTn>
-                  </p:par>
-                </p:childTnLst>
-              </p:cTn>
-              <p:nextCondLst>
-                <p:cond evt="onClick" delay="0">
-                  <p:tgtEl>
-                    <p:spTgt spid="10"/>
-                  </p:tgtEl>
-                </p:cond>
-              </p:nextCondLst>
-            </p:seq>
-          </p:childTnLst>
-        </p:cTn>
-      </p:par>
-    </p:tnLst>
-  </p:timing>
 </p:sld>
 </file>
 
 <file path=ppt/slides/slide14.xml><?xml version="1.0" encoding="utf-8"?>
-<p:sld xmlns:a="http://schemas.openxmlformats.org/drawingml/2006/main" xmlns:r="http://schemas.openxmlformats.org/officeDocument/2006/relationships" xmlns:p="http://schemas.openxmlformats.org/presentationml/2006/main" xmlns:p14="http://schemas.microsoft.com/office/powerpoint/2010/main">
+<p:sld xmlns:a="http://schemas.openxmlformats.org/drawingml/2006/main" xmlns:r="http://schemas.openxmlformats.org/officeDocument/2006/relationships" xmlns:p="http://schemas.openxmlformats.org/presentationml/2006/main">
   <p:cSld>
     <p:spTree>
       <p:nvGrpSpPr>
@@ -5642,63 +5427,41 @@
           <a:lstStyle/>
           <a:p>
             <a:r>
-              <a:rPr lang="en-US" altLang="ko-KR" dirty="0" smtClean="0"/>
+              <a:rPr lang="en-US" altLang="ko-KR" dirty="0"/>
               <a:t> </a:t>
             </a:r>
             <a:r>
-              <a:rPr lang="ko-KR" altLang="en-US" dirty="0" smtClean="0"/>
+              <a:rPr lang="ko-KR" altLang="en-US" dirty="0"/>
               <a:t>결론</a:t>
             </a:r>
-            <a:endParaRPr lang="en-US" altLang="ko-KR" dirty="0" smtClean="0"/>
-          </a:p>
-        </p:txBody>
-      </p:sp>
-      <p:sp>
-        <p:nvSpPr>
-          <p:cNvPr id="2" name="Content Placeholder 1"/>
-          <p:cNvSpPr>
-            <a:spLocks noGrp="1"/>
-          </p:cNvSpPr>
-          <p:nvPr>
-            <p:ph idx="1"/>
-          </p:nvPr>
-        </p:nvSpPr>
-        <p:spPr>
-          <a:xfrm>
-            <a:off x="1692910" y="672465"/>
-            <a:ext cx="6912610" cy="460375"/>
-          </a:xfrm>
-        </p:spPr>
-        <p:txBody>
-          <a:bodyPr/>
-          <a:lstStyle/>
-          <a:p>
-            <a:r>
-              <a:rPr lang="en-US" b="1" dirty="0"/>
-              <a:t>Framerate Overview</a:t>
-            </a:r>
-            <a:endParaRPr lang="en-US" b="1" dirty="0"/>
+            <a:endParaRPr lang="en-US" altLang="ko-KR" dirty="0"/>
           </a:p>
         </p:txBody>
       </p:sp>
       <p:pic>
         <p:nvPicPr>
-          <p:cNvPr id="8" name="Picture 7"/>
+          <p:cNvPr id="5" name="그림 4">
+            <a:extLst>
+              <a:ext uri="{FF2B5EF4-FFF2-40B4-BE49-F238E27FC236}">
+                <a16:creationId xmlns:a16="http://schemas.microsoft.com/office/drawing/2014/main" id="{C603A755-6286-9DD3-6585-47619C15EB7B}"/>
+              </a:ext>
+            </a:extLst>
+          </p:cNvPr>
           <p:cNvPicPr>
             <a:picLocks noChangeAspect="1"/>
           </p:cNvPicPr>
           <p:nvPr/>
         </p:nvPicPr>
         <p:blipFill>
-          <a:blip r:embed="rId1"/>
+          <a:blip r:embed="rId2"/>
           <a:stretch>
             <a:fillRect/>
           </a:stretch>
         </p:blipFill>
         <p:spPr>
           <a:xfrm>
-            <a:off x="1692910" y="1059815"/>
-            <a:ext cx="7268210" cy="3930650"/>
+            <a:off x="1619885" y="771550"/>
+            <a:ext cx="7319416" cy="4176464"/>
           </a:xfrm>
           <a:prstGeom prst="rect">
             <a:avLst/>
@@ -5710,26 +5473,11 @@
   <p:clrMapOvr>
     <a:masterClrMapping/>
   </p:clrMapOvr>
-  <mc:AlternateContent xmlns:mc="http://schemas.openxmlformats.org/markup-compatibility/2006">
-    <mc:Choice xmlns:p14="http://schemas.microsoft.com/office/powerpoint/2010/main" Requires="p14">
-      <p:transition spd="slow" p14:dur="2000"/>
-    </mc:Choice>
-    <mc:Fallback>
-      <p:transition spd="slow"/>
-    </mc:Fallback>
-  </mc:AlternateContent>
-  <p:timing>
-    <p:tnLst>
-      <p:par>
-        <p:cTn id="1" dur="indefinite" restart="never" nodeType="tmRoot"/>
-      </p:par>
-    </p:tnLst>
-  </p:timing>
 </p:sld>
 </file>
 
 <file path=ppt/slides/slide15.xml><?xml version="1.0" encoding="utf-8"?>
-<p:sld xmlns:a="http://schemas.openxmlformats.org/drawingml/2006/main" xmlns:r="http://schemas.openxmlformats.org/officeDocument/2006/relationships" xmlns:p="http://schemas.openxmlformats.org/presentationml/2006/main" xmlns:p14="http://schemas.microsoft.com/office/powerpoint/2010/main">
+<p:sld xmlns:a="http://schemas.openxmlformats.org/drawingml/2006/main" xmlns:r="http://schemas.openxmlformats.org/officeDocument/2006/relationships" xmlns:p="http://schemas.openxmlformats.org/presentationml/2006/main">
   <p:cSld>
     <p:spTree>
       <p:nvGrpSpPr>
@@ -5766,10 +5514,10 @@
           <a:lstStyle/>
           <a:p>
             <a:r>
-              <a:rPr lang="ko-KR" altLang="en-US" dirty="0" smtClean="0"/>
+              <a:rPr lang="ko-KR" altLang="en-US" dirty="0"/>
               <a:t>결론</a:t>
             </a:r>
-            <a:endParaRPr lang="en-US" altLang="ko-KR" dirty="0" smtClean="0"/>
+            <a:endParaRPr lang="en-US" altLang="ko-KR" dirty="0"/>
           </a:p>
         </p:txBody>
       </p:sp>
@@ -5790,7 +5538,7 @@
           </a:xfrm>
         </p:spPr>
         <p:txBody>
-          <a:bodyPr wrap="square" lIns="396240" tIns="45720" rIns="91440" bIns="45720" numCol="1" vert="horz" anchor="t">
+          <a:bodyPr vert="horz" wrap="square" lIns="396240" tIns="45720" rIns="91440" bIns="45720" numCol="1" anchor="t">
             <a:noAutofit/>
           </a:bodyPr>
           <a:lstStyle/>
@@ -6106,21 +5854,6 @@
   <p:clrMapOvr>
     <a:masterClrMapping/>
   </p:clrMapOvr>
-  <mc:AlternateContent xmlns:mc="http://schemas.openxmlformats.org/markup-compatibility/2006">
-    <mc:Choice xmlns:p14="http://schemas.microsoft.com/office/powerpoint/2010/main" Requires="p14">
-      <p:transition spd="slow" p14:dur="2000"/>
-    </mc:Choice>
-    <mc:Fallback>
-      <p:transition spd="slow"/>
-    </mc:Fallback>
-  </mc:AlternateContent>
-  <p:timing>
-    <p:tnLst>
-      <p:par>
-        <p:cTn id="1" dur="indefinite" restart="never" nodeType="tmRoot"/>
-      </p:par>
-    </p:tnLst>
-  </p:timing>
 </p:sld>
 </file>
 
@@ -6145,21 +5878,23 @@
         <p:nvSpPr>
           <p:cNvPr id="3" name="Title 2"/>
           <p:cNvSpPr txBox="1">
-            <a:spLocks/>
+            <a:spLocks noGrp="1"/>
           </p:cNvSpPr>
           <p:nvPr>
             <p:ph type="title"/>
           </p:nvPr>
         </p:nvSpPr>
         <p:spPr>
-          <a:xfrm rot="0">
+          <a:xfrm>
             <a:off x="1619885" y="0"/>
             <a:ext cx="7524749" cy="885190"/>
           </a:xfrm>
-          <a:prstGeom prst="rect"/>
-        </p:spPr>
-        <p:txBody>
-          <a:bodyPr wrap="square" lIns="91440" tIns="45720" rIns="91440" bIns="45720" numCol="1" vert="horz" anchor="ctr">
+          <a:prstGeom prst="rect">
+            <a:avLst/>
+          </a:prstGeom>
+        </p:spPr>
+        <p:txBody>
+          <a:bodyPr vert="horz" wrap="square" lIns="91440" tIns="45720" rIns="91440" bIns="45720" numCol="1" anchor="ctr">
             <a:noAutofit/>
           </a:bodyPr>
           <a:lstStyle/>
@@ -6174,15 +5909,7 @@
                 <a:ea typeface="맑은 고딕" charset="0"/>
                 <a:cs typeface="Arial" charset="0"/>
               </a:rPr>
-              <a:t>프로젝트를</a:t>
-            </a:r>
-            <a:r>
-              <a:rPr lang="en-US" altLang="ko-KR" sz="3600" b="1">
-                <a:latin typeface="Arial" charset="0"/>
-                <a:ea typeface="맑은 고딕" charset="0"/>
-                <a:cs typeface="Arial" charset="0"/>
-              </a:rPr>
-              <a:t> 통해 배운 점</a:t>
+              <a:t>프로젝트를 통해 배운 점</a:t>
             </a:r>
             <a:endParaRPr lang="ko-KR" altLang="en-US" sz="3600" b="1">
               <a:latin typeface="Arial" charset="0"/>
@@ -6196,21 +5923,23 @@
         <p:nvSpPr>
           <p:cNvPr id="2" name="Content Placeholder 1"/>
           <p:cNvSpPr txBox="1">
-            <a:spLocks/>
-          </p:cNvSpPr>
-          <p:nvPr>
-            <p:ph type="obj" idx="1"/>
-          </p:nvPr>
-        </p:nvSpPr>
-        <p:spPr>
-          <a:xfrm rot="0">
+            <a:spLocks noGrp="1"/>
+          </p:cNvSpPr>
+          <p:nvPr>
+            <p:ph idx="1"/>
+          </p:nvPr>
+        </p:nvSpPr>
+        <p:spPr>
+          <a:xfrm>
             <a:off x="1979930" y="987425"/>
             <a:ext cx="6913245" cy="461010"/>
           </a:xfrm>
-          <a:prstGeom prst="rect"/>
-        </p:spPr>
-        <p:txBody>
-          <a:bodyPr wrap="square" lIns="91440" tIns="45720" rIns="91440" bIns="45720" numCol="1" vert="horz" anchor="ctr">
+          <a:prstGeom prst="rect">
+            <a:avLst/>
+          </a:prstGeom>
+        </p:spPr>
+        <p:txBody>
+          <a:bodyPr vert="horz" wrap="square" lIns="91440" tIns="45720" rIns="91440" bIns="45720" numCol="1" anchor="ctr">
             <a:noAutofit/>
           </a:bodyPr>
           <a:lstStyle/>
@@ -6225,15 +5954,7 @@
                 <a:ea typeface="맑은 고딕" charset="0"/>
                 <a:cs typeface="+mn-cs"/>
               </a:rPr>
-              <a:t>-</a:t>
-            </a:r>
-            <a:r>
-              <a:rPr lang="en-US" altLang="ko-KR" sz="1400" b="1">
-                <a:latin typeface="맑은 고딕" charset="0"/>
-                <a:ea typeface="맑은 고딕" charset="0"/>
-                <a:cs typeface="+mn-cs"/>
-              </a:rPr>
-              <a:t> 이우진</a:t>
+              <a:t>- 이우진</a:t>
             </a:r>
             <a:endParaRPr lang="ko-KR" altLang="en-US" sz="1400" b="1">
               <a:latin typeface="맑은 고딕" charset="0"/>
@@ -6247,21 +5968,23 @@
         <p:nvSpPr>
           <p:cNvPr id="5" name="Content Placeholder 2"/>
           <p:cNvSpPr txBox="1">
-            <a:spLocks/>
-          </p:cNvSpPr>
-          <p:nvPr>
-            <p:ph type="obj" idx="10"/>
-          </p:nvPr>
-        </p:nvSpPr>
-        <p:spPr>
-          <a:xfrm rot="0">
+            <a:spLocks noGrp="1"/>
+          </p:cNvSpPr>
+          <p:nvPr>
+            <p:ph idx="10"/>
+          </p:nvPr>
+        </p:nvSpPr>
+        <p:spPr>
+          <a:xfrm>
             <a:off x="1982470" y="1349375"/>
             <a:ext cx="6913245" cy="306705"/>
           </a:xfrm>
-          <a:prstGeom prst="rect"/>
-        </p:spPr>
-        <p:txBody>
-          <a:bodyPr wrap="square" lIns="396240" tIns="45720" rIns="91440" bIns="45720" numCol="1" vert="horz" anchor="t">
+          <a:prstGeom prst="rect">
+            <a:avLst/>
+          </a:prstGeom>
+        </p:spPr>
+        <p:txBody>
+          <a:bodyPr vert="horz" wrap="square" lIns="396240" tIns="45720" rIns="91440" bIns="45720" numCol="1" anchor="t">
             <a:noAutofit/>
           </a:bodyPr>
           <a:lstStyle>
@@ -6289,15 +6012,7 @@
                 <a:ea typeface="맑은 고딕" charset="0"/>
                 <a:cs typeface="+mn-cs"/>
               </a:rPr>
-              <a:t>프레임</a:t>
-            </a:r>
-            <a:r>
-              <a:rPr lang="en-US" altLang="ko-KR" sz="1400">
-                <a:latin typeface="맑은 고딕" charset="0"/>
-                <a:ea typeface="맑은 고딕" charset="0"/>
-                <a:cs typeface="+mn-cs"/>
-              </a:rPr>
-              <a:t> 단위로 찍어내는 실시간 렌더링에 대한 이해도 상승 </a:t>
+              <a:t>프레임 단위로 찍어내는 실시간 렌더링에 대한 이해도 상승 </a:t>
             </a:r>
             <a:endParaRPr lang="ko-KR" altLang="en-US" sz="1400">
               <a:latin typeface="맑은 고딕" charset="0"/>
@@ -6316,19 +6031,21 @@
           <p:nvPr/>
         </p:nvSpPr>
         <p:spPr>
-          <a:xfrm rot="0">
+          <a:xfrm>
             <a:off x="1978659" y="1608455"/>
             <a:ext cx="6913245" cy="461010"/>
           </a:xfrm>
-          <a:prstGeom prst="rect"/>
-        </p:spPr>
-        <p:txBody>
-          <a:bodyPr wrap="square" lIns="91440" tIns="45720" rIns="91440" bIns="45720" numCol="1" vert="horz" anchor="ctr">
+          <a:prstGeom prst="rect">
+            <a:avLst/>
+          </a:prstGeom>
+        </p:spPr>
+        <p:txBody>
+          <a:bodyPr vert="horz" wrap="square" lIns="91440" tIns="45720" rIns="91440" bIns="45720" numCol="1" anchor="ctr">
             <a:noAutofit/>
           </a:bodyPr>
           <a:lstStyle/>
           <a:p>
-            <a:pPr marL="0" indent="0" rtl="0" algn="l" defTabSz="914400" eaLnBrk="1" latinLnBrk="0" hangingPunct="1">
+            <a:pPr marL="0" indent="0" algn="l" defTabSz="914400" rtl="0" eaLnBrk="1" latinLnBrk="0" hangingPunct="1">
               <a:spcBef>
                 <a:spcPct val="20000"/>
               </a:spcBef>
@@ -6341,15 +6058,7 @@
                 <a:ea typeface="맑은 고딕" charset="0"/>
                 <a:cs typeface="+mn-cs"/>
               </a:rPr>
-              <a:t>-</a:t>
-            </a:r>
-            <a:r>
-              <a:rPr lang="en-US" altLang="ko-KR" sz="1400" b="1">
-                <a:latin typeface="맑은 고딕" charset="0"/>
-                <a:ea typeface="맑은 고딕" charset="0"/>
-                <a:cs typeface="+mn-cs"/>
-              </a:rPr>
-              <a:t> 이수정</a:t>
+              <a:t>- 이수정</a:t>
             </a:r>
             <a:endParaRPr lang="ko-KR" altLang="en-US" sz="1400" b="1">
               <a:latin typeface="맑은 고딕" charset="0"/>
@@ -6368,14 +6077,16 @@
           <p:nvPr/>
         </p:nvSpPr>
         <p:spPr>
-          <a:xfrm rot="0">
+          <a:xfrm>
             <a:off x="1981199" y="1970404"/>
             <a:ext cx="6913245" cy="306705"/>
           </a:xfrm>
-          <a:prstGeom prst="rect"/>
-        </p:spPr>
-        <p:txBody>
-          <a:bodyPr wrap="square" lIns="396240" tIns="45720" rIns="91440" bIns="45720" numCol="1" vert="horz" anchor="t">
+          <a:prstGeom prst="rect">
+            <a:avLst/>
+          </a:prstGeom>
+        </p:spPr>
+        <p:txBody>
+          <a:bodyPr vert="horz" wrap="square" lIns="396240" tIns="45720" rIns="91440" bIns="45720" numCol="1" anchor="t">
             <a:noAutofit/>
           </a:bodyPr>
           <a:lstStyle>
@@ -6393,7 +6104,7 @@
             </a:lvl1pPr>
           </a:lstStyle>
           <a:p>
-            <a:pPr marL="0" indent="0" rtl="0" algn="l" defTabSz="914400" eaLnBrk="1" latinLnBrk="0" hangingPunct="1">
+            <a:pPr marL="0" indent="0" algn="l" defTabSz="914400" rtl="0" eaLnBrk="1" latinLnBrk="0" hangingPunct="1">
               <a:spcBef>
                 <a:spcPct val="20000"/>
               </a:spcBef>
@@ -6406,15 +6117,7 @@
                 <a:ea typeface="맑은 고딕" charset="0"/>
                 <a:cs typeface="+mn-cs"/>
               </a:rPr>
-              <a:t>오픈소스를</a:t>
-            </a:r>
-            <a:r>
-              <a:rPr lang="en-US" altLang="ko-KR" sz="1400">
-                <a:latin typeface="맑은 고딕" charset="0"/>
-                <a:ea typeface="맑은 고딕" charset="0"/>
-                <a:cs typeface="+mn-cs"/>
-              </a:rPr>
-              <a:t> 어떤 식으로 이용해야 하는 지 배움</a:t>
+              <a:t>오픈소스를 어떤 식으로 이용해야 하는 지 배움</a:t>
             </a:r>
             <a:endParaRPr lang="ko-KR" altLang="en-US" sz="1400">
               <a:latin typeface="맑은 고딕" charset="0"/>
@@ -6433,19 +6136,21 @@
           <p:nvPr/>
         </p:nvSpPr>
         <p:spPr>
-          <a:xfrm rot="0">
+          <a:xfrm>
             <a:off x="1978659" y="2216150"/>
             <a:ext cx="6913245" cy="461010"/>
           </a:xfrm>
-          <a:prstGeom prst="rect"/>
-        </p:spPr>
-        <p:txBody>
-          <a:bodyPr wrap="square" lIns="91440" tIns="45720" rIns="91440" bIns="45720" numCol="1" vert="horz" anchor="ctr">
+          <a:prstGeom prst="rect">
+            <a:avLst/>
+          </a:prstGeom>
+        </p:spPr>
+        <p:txBody>
+          <a:bodyPr vert="horz" wrap="square" lIns="91440" tIns="45720" rIns="91440" bIns="45720" numCol="1" anchor="ctr">
             <a:noAutofit/>
           </a:bodyPr>
           <a:lstStyle/>
           <a:p>
-            <a:pPr marL="0" indent="0" rtl="0" algn="l" defTabSz="914400" eaLnBrk="1" latinLnBrk="0" hangingPunct="1">
+            <a:pPr marL="0" indent="0" algn="l" defTabSz="914400" rtl="0" eaLnBrk="1" latinLnBrk="0" hangingPunct="1">
               <a:spcBef>
                 <a:spcPct val="20000"/>
               </a:spcBef>
@@ -6458,15 +6163,7 @@
                 <a:ea typeface="맑은 고딕" charset="0"/>
                 <a:cs typeface="+mn-cs"/>
               </a:rPr>
-              <a:t>-</a:t>
-            </a:r>
-            <a:r>
-              <a:rPr lang="en-US" altLang="ko-KR" sz="1400" b="1">
-                <a:latin typeface="맑은 고딕" charset="0"/>
-                <a:ea typeface="맑은 고딕" charset="0"/>
-                <a:cs typeface="+mn-cs"/>
-              </a:rPr>
-              <a:t> 강윤수</a:t>
+              <a:t>- 강윤수</a:t>
             </a:r>
             <a:endParaRPr lang="ko-KR" altLang="en-US" sz="1400" b="1">
               <a:latin typeface="맑은 고딕" charset="0"/>
@@ -6485,14 +6182,16 @@
           <p:nvPr/>
         </p:nvSpPr>
         <p:spPr>
-          <a:xfrm rot="0">
+          <a:xfrm>
             <a:off x="1981199" y="2578100"/>
             <a:ext cx="6913245" cy="306705"/>
           </a:xfrm>
-          <a:prstGeom prst="rect"/>
-        </p:spPr>
-        <p:txBody>
-          <a:bodyPr wrap="square" lIns="396240" tIns="45720" rIns="91440" bIns="45720" numCol="1" vert="horz" anchor="t">
+          <a:prstGeom prst="rect">
+            <a:avLst/>
+          </a:prstGeom>
+        </p:spPr>
+        <p:txBody>
+          <a:bodyPr vert="horz" wrap="square" lIns="396240" tIns="45720" rIns="91440" bIns="45720" numCol="1" anchor="t">
             <a:noAutofit/>
           </a:bodyPr>
           <a:lstStyle>
@@ -6510,7 +6209,7 @@
             </a:lvl1pPr>
           </a:lstStyle>
           <a:p>
-            <a:pPr marL="0" indent="0" rtl="0" algn="l" defTabSz="914400" eaLnBrk="1" latinLnBrk="0" hangingPunct="1">
+            <a:pPr marL="0" indent="0" algn="l" defTabSz="914400" rtl="0" eaLnBrk="1" latinLnBrk="0" hangingPunct="1">
               <a:spcBef>
                 <a:spcPct val="20000"/>
               </a:spcBef>
@@ -6518,26 +6217,13 @@
               <a:buNone/>
             </a:pPr>
             <a:r>
-              <a:rPr lang="en-US" altLang="ko-KR" sz="1400">
+              <a:rPr lang="ko-KR" altLang="en-US" sz="1400" dirty="0">
                 <a:latin typeface="맑은 고딕" charset="0"/>
                 <a:ea typeface="맑은 고딕" charset="0"/>
                 <a:cs typeface="+mn-cs"/>
               </a:rPr>
-              <a:t>잠도</a:t>
-            </a:r>
-            <a:r>
-              <a:rPr lang="en-US" altLang="ko-KR" sz="1400">
-                <a:latin typeface="맑은 고딕" charset="0"/>
-                <a:ea typeface="맑은 고딕" charset="0"/>
-                <a:cs typeface="+mn-cs"/>
-              </a:rPr>
-              <a:t> 안자고 코로나 걸려도 사람은 더 갈려나갈 수 있다는 것을 체감</a:t>
-            </a:r>
-            <a:endParaRPr lang="ko-KR" altLang="en-US" sz="1400">
-              <a:latin typeface="맑은 고딕" charset="0"/>
-              <a:ea typeface="맑은 고딕" charset="0"/>
-              <a:cs typeface="+mn-cs"/>
-            </a:endParaRPr>
+              <a:t>다양한 프로그래밍 언어들 속에서 원하는 걸 찾아내는 분석 능력 상승</a:t>
+            </a:r>
           </a:p>
         </p:txBody>
       </p:sp>
@@ -6550,19 +6236,21 @@
           <p:nvPr/>
         </p:nvSpPr>
         <p:spPr>
-          <a:xfrm rot="0">
+          <a:xfrm>
             <a:off x="1977390" y="2837180"/>
             <a:ext cx="6913245" cy="461010"/>
           </a:xfrm>
-          <a:prstGeom prst="rect"/>
-        </p:spPr>
-        <p:txBody>
-          <a:bodyPr wrap="square" lIns="91440" tIns="45720" rIns="91440" bIns="45720" numCol="1" vert="horz" anchor="ctr">
+          <a:prstGeom prst="rect">
+            <a:avLst/>
+          </a:prstGeom>
+        </p:spPr>
+        <p:txBody>
+          <a:bodyPr vert="horz" wrap="square" lIns="91440" tIns="45720" rIns="91440" bIns="45720" numCol="1" anchor="ctr">
             <a:noAutofit/>
           </a:bodyPr>
           <a:lstStyle/>
           <a:p>
-            <a:pPr marL="0" indent="0" rtl="0" algn="l" defTabSz="914400" eaLnBrk="1" latinLnBrk="0" hangingPunct="1">
+            <a:pPr marL="0" indent="0" algn="l" defTabSz="914400" rtl="0" eaLnBrk="1" latinLnBrk="0" hangingPunct="1">
               <a:spcBef>
                 <a:spcPct val="20000"/>
               </a:spcBef>
@@ -6575,15 +6263,7 @@
                 <a:ea typeface="맑은 고딕" charset="0"/>
                 <a:cs typeface="+mn-cs"/>
               </a:rPr>
-              <a:t>-</a:t>
-            </a:r>
-            <a:r>
-              <a:rPr lang="en-US" altLang="ko-KR" sz="1400" b="1">
-                <a:latin typeface="맑은 고딕" charset="0"/>
-                <a:ea typeface="맑은 고딕" charset="0"/>
-                <a:cs typeface="+mn-cs"/>
-              </a:rPr>
-              <a:t> 강태형</a:t>
+              <a:t>- 강태형</a:t>
             </a:r>
             <a:endParaRPr lang="ko-KR" altLang="en-US" sz="1400" b="1">
               <a:latin typeface="맑은 고딕" charset="0"/>
@@ -6602,14 +6282,16 @@
           <p:nvPr/>
         </p:nvSpPr>
         <p:spPr>
-          <a:xfrm rot="0">
+          <a:xfrm>
             <a:off x="1979930" y="3199130"/>
             <a:ext cx="6913245" cy="306705"/>
           </a:xfrm>
-          <a:prstGeom prst="rect"/>
-        </p:spPr>
-        <p:txBody>
-          <a:bodyPr wrap="square" lIns="396240" tIns="45720" rIns="91440" bIns="45720" numCol="1" vert="horz" anchor="t">
+          <a:prstGeom prst="rect">
+            <a:avLst/>
+          </a:prstGeom>
+        </p:spPr>
+        <p:txBody>
+          <a:bodyPr vert="horz" wrap="square" lIns="396240" tIns="45720" rIns="91440" bIns="45720" numCol="1" anchor="t">
             <a:noAutofit/>
           </a:bodyPr>
           <a:lstStyle>
@@ -6627,7 +6309,7 @@
             </a:lvl1pPr>
           </a:lstStyle>
           <a:p>
-            <a:pPr marL="0" indent="0" rtl="0" algn="l" defTabSz="914400" eaLnBrk="1" latinLnBrk="0" hangingPunct="1">
+            <a:pPr marL="0" indent="0" algn="l" defTabSz="914400" rtl="0" eaLnBrk="1" latinLnBrk="0" hangingPunct="1">
               <a:spcBef>
                 <a:spcPct val="20000"/>
               </a:spcBef>
@@ -6640,15 +6322,7 @@
                 <a:ea typeface="맑은 고딕" charset="0"/>
                 <a:cs typeface="+mn-cs"/>
               </a:rPr>
-              <a:t>프로젝트</a:t>
-            </a:r>
-            <a:r>
-              <a:rPr lang="en-US" altLang="ko-KR" sz="1400">
-                <a:latin typeface="맑은 고딕" charset="0"/>
-                <a:ea typeface="맑은 고딕" charset="0"/>
-                <a:cs typeface="+mn-cs"/>
-              </a:rPr>
-              <a:t> 시의 협업 방법과 오픈소스 프로젝트를 활용하는 방법을 익힘 </a:t>
+              <a:t>프로젝트 시의 협업 방법과 오픈소스 프로젝트를 활용하는 방법을 익힘 </a:t>
             </a:r>
             <a:endParaRPr lang="ko-KR" altLang="en-US" sz="1400">
               <a:latin typeface="맑은 고딕" charset="0"/>
@@ -6663,14 +6337,6 @@
   <p:clrMapOvr>
     <a:masterClrMapping/>
   </p:clrMapOvr>
-  <mc:AlternateContent xmlns:mc="http://schemas.openxmlformats.org/markup-compatibility/2006">
-    <mc:Choice xmlns:p14="http://schemas.microsoft.com/office/powerpoint/2010/main" Requires="p14">
-      <p:transition spd="slow" p14:dur="2000"/>
-    </mc:Choice>
-    <mc:Fallback>
-      <p:transition spd="slow"/>
-    </mc:Fallback>
-  </mc:AlternateContent>
   <p:timing>
     <p:tnLst>
       <p:par>
@@ -6739,11 +6405,13 @@
           </a:stretch>
         </p:blipFill>
         <p:spPr>
-          <a:xfrm rot="0" flipH="1">
+          <a:xfrm flipH="1">
             <a:off x="635" y="1231265"/>
             <a:ext cx="9177655" cy="2806065"/>
           </a:xfrm>
-          <a:prstGeom prst="rect"/>
+          <a:prstGeom prst="rect">
+            <a:avLst/>
+          </a:prstGeom>
           <a:noFill/>
         </p:spPr>
       </p:pic>
@@ -6756,11 +6424,13 @@
           <p:nvPr/>
         </p:nvSpPr>
         <p:spPr bwMode="auto">
-          <a:xfrm rot="0">
+          <a:xfrm>
             <a:off x="337820" y="2764155"/>
             <a:ext cx="3708400" cy="584200"/>
           </a:xfrm>
-          <a:prstGeom prst="rect"/>
+          <a:prstGeom prst="rect">
+            <a:avLst/>
+          </a:prstGeom>
           <a:noFill/>
           <a:ln>
             <a:noFill/>
@@ -6768,7 +6438,7 @@
           </a:ln>
         </p:spPr>
         <p:txBody>
-          <a:bodyPr wrap="square" lIns="91440" tIns="45720" rIns="91440" bIns="45720" numCol="1" vert="horz" anchor="t">
+          <a:bodyPr vert="horz" wrap="square" lIns="91440" tIns="45720" rIns="91440" bIns="45720" numCol="1" anchor="t">
             <a:spAutoFit/>
           </a:bodyPr>
           <a:lstStyle/>
@@ -6808,11 +6478,13 @@
           <p:nvPr/>
         </p:nvSpPr>
         <p:spPr>
-          <a:xfrm rot="0">
+          <a:xfrm>
             <a:off x="615315" y="3310890"/>
             <a:ext cx="1370330" cy="264795"/>
           </a:xfrm>
-          <a:prstGeom prst="rect"/>
+          <a:prstGeom prst="rect">
+            <a:avLst/>
+          </a:prstGeom>
           <a:solidFill>
             <a:srgbClr val="3CB921"/>
           </a:solidFill>
@@ -6842,7 +6514,7 @@
           </a:fontRef>
         </p:style>
         <p:txBody>
-          <a:bodyPr wrap="square" lIns="91440" tIns="45720" rIns="91440" bIns="45720" vert="horz" anchor="ctr">
+          <a:bodyPr vert="horz" wrap="square" lIns="91440" tIns="45720" rIns="91440" bIns="45720" anchor="ctr">
             <a:noAutofit/>
           </a:bodyPr>
           <a:lstStyle/>
@@ -6860,26 +6532,11 @@
   <p:clrMapOvr>
     <a:masterClrMapping/>
   </p:clrMapOvr>
-  <mc:AlternateContent xmlns:mc="http://schemas.openxmlformats.org/markup-compatibility/2006">
-    <mc:Choice xmlns:p14="http://schemas.microsoft.com/office/powerpoint/2010/main" Requires="p14">
-      <p:transition spd="slow" p14:dur="2000"/>
-    </mc:Choice>
-    <mc:Fallback>
-      <p:transition spd="slow"/>
-    </mc:Fallback>
-  </mc:AlternateContent>
-  <p:timing>
-    <p:tnLst>
-      <p:par>
-        <p:cTn id="1" dur="indefinite" restart="never" nodeType="tmRoot"/>
-      </p:par>
-    </p:tnLst>
-  </p:timing>
 </p:sld>
 </file>
 
 <file path=ppt/slides/slide2.xml><?xml version="1.0" encoding="utf-8"?>
-<p:sld xmlns:a="http://schemas.openxmlformats.org/drawingml/2006/main" xmlns:r="http://schemas.openxmlformats.org/officeDocument/2006/relationships" xmlns:p="http://schemas.openxmlformats.org/presentationml/2006/main" xmlns:p14="http://schemas.microsoft.com/office/powerpoint/2010/main">
+<p:sld xmlns:a="http://schemas.openxmlformats.org/drawingml/2006/main" xmlns:r="http://schemas.openxmlformats.org/officeDocument/2006/relationships" xmlns:p="http://schemas.openxmlformats.org/presentationml/2006/main">
   <p:cSld>
     <p:spTree>
       <p:nvGrpSpPr>
@@ -6912,7 +6569,7 @@
           </a:xfrm>
         </p:spPr>
         <p:txBody>
-          <a:bodyPr wrap="square" lIns="91440" tIns="45720" rIns="91440" bIns="45720" numCol="1" vert="horz" anchor="ctr">
+          <a:bodyPr vert="horz" wrap="square" lIns="91440" tIns="45720" rIns="91440" bIns="45720" numCol="1" anchor="ctr">
             <a:noAutofit/>
           </a:bodyPr>
           <a:lstStyle/>
@@ -6930,15 +6587,7 @@
                 <a:ea typeface="맑은 고딕" charset="0"/>
                 <a:cs typeface="Arial" charset="0"/>
               </a:rPr>
-              <a:t>1.</a:t>
-            </a:r>
-            <a:r>
-              <a:rPr lang="en-US" sz="2000" b="1">
-                <a:latin typeface="Arial" charset="0"/>
-                <a:ea typeface="맑은 고딕" charset="0"/>
-                <a:cs typeface="Arial" charset="0"/>
-              </a:rPr>
-              <a:t> 프로젝트 목적 소개</a:t>
+              <a:t>1. 프로젝트 목적 소개</a:t>
             </a:r>
             <a:endParaRPr lang="ko-KR" altLang="en-US" sz="2000" b="1">
               <a:latin typeface="Arial" charset="0"/>
@@ -6960,15 +6609,7 @@
                 <a:ea typeface="맑은 고딕" charset="0"/>
                 <a:cs typeface="Arial" charset="0"/>
               </a:rPr>
-              <a:t>2.</a:t>
-            </a:r>
-            <a:r>
-              <a:rPr lang="en-US" sz="2000" b="1">
-                <a:latin typeface="Arial" charset="0"/>
-                <a:ea typeface="맑은 고딕" charset="0"/>
-                <a:cs typeface="Arial" charset="0"/>
-              </a:rPr>
-              <a:t> 프로젝트 목적 변경</a:t>
+              <a:t>2. 프로젝트 목적 변경</a:t>
             </a:r>
             <a:endParaRPr lang="ko-KR" altLang="en-US" sz="2000" b="1">
               <a:latin typeface="Arial" charset="0"/>
@@ -7126,10 +6767,6 @@
               </a:rPr>
               <a:t>이미지</a:t>
             </a:r>
-            <a:endParaRPr lang="ko-KR" altLang="en-US" b="1">
-              <a:latin typeface="Arial" charset="0"/>
-              <a:cs typeface="Arial" charset="0"/>
-            </a:endParaRPr>
           </a:p>
           <a:p>
             <a:pPr marL="0" indent="0" latinLnBrk="0">
@@ -7161,10 +6798,6 @@
               </a:rPr>
               <a:t>결론</a:t>
             </a:r>
-            <a:endParaRPr lang="ko-KR" altLang="en-US" b="1">
-              <a:latin typeface="Arial" charset="0"/>
-              <a:cs typeface="Arial" charset="0"/>
-            </a:endParaRPr>
           </a:p>
           <a:p>
             <a:pPr marL="0" indent="0" latinLnBrk="0">
@@ -7180,15 +6813,7 @@
                 <a:ea typeface="맑은 고딕" charset="0"/>
                 <a:cs typeface="Arial" charset="0"/>
               </a:rPr>
-              <a:t>7.</a:t>
-            </a:r>
-            <a:r>
-              <a:rPr lang="ko-KR" altLang="en-US" sz="2000" b="1">
-                <a:latin typeface="Arial" charset="0"/>
-                <a:ea typeface="맑은 고딕" charset="0"/>
-                <a:cs typeface="Arial" charset="0"/>
-              </a:rPr>
-              <a:t> 프로젝트를 통해 배운 점</a:t>
+              <a:t>7. 프로젝트를 통해 배운 점</a:t>
             </a:r>
             <a:endParaRPr lang="ko-KR" altLang="en-US" b="1">
               <a:latin typeface="Arial" charset="0"/>
@@ -7234,21 +6859,6 @@
   <p:clrMapOvr>
     <a:masterClrMapping/>
   </p:clrMapOvr>
-  <mc:AlternateContent xmlns:mc="http://schemas.openxmlformats.org/markup-compatibility/2006">
-    <mc:Choice xmlns:p14="http://schemas.microsoft.com/office/powerpoint/2010/main" Requires="p14">
-      <p:transition spd="slow" p14:dur="2000"/>
-    </mc:Choice>
-    <mc:Fallback>
-      <p:transition spd="slow"/>
-    </mc:Fallback>
-  </mc:AlternateContent>
-  <p:timing>
-    <p:tnLst>
-      <p:par>
-        <p:cTn id="1" dur="indefinite" restart="never" nodeType="tmRoot"/>
-      </p:par>
-    </p:tnLst>
-  </p:timing>
 </p:sld>
 </file>
 
@@ -7273,21 +6883,23 @@
         <p:nvSpPr>
           <p:cNvPr id="3" name="Title 2"/>
           <p:cNvSpPr txBox="1">
-            <a:spLocks/>
+            <a:spLocks noGrp="1"/>
           </p:cNvSpPr>
           <p:nvPr>
             <p:ph type="title"/>
           </p:nvPr>
         </p:nvSpPr>
         <p:spPr>
-          <a:xfrm rot="0">
+          <a:xfrm>
             <a:off x="1619885" y="0"/>
             <a:ext cx="7524749" cy="885190"/>
           </a:xfrm>
-          <a:prstGeom prst="rect"/>
-        </p:spPr>
-        <p:txBody>
-          <a:bodyPr wrap="square" lIns="91440" tIns="45720" rIns="91440" bIns="45720" numCol="1" vert="horz" anchor="ctr">
+          <a:prstGeom prst="rect">
+            <a:avLst/>
+          </a:prstGeom>
+        </p:spPr>
+        <p:txBody>
+          <a:bodyPr vert="horz" wrap="square" lIns="91440" tIns="45720" rIns="91440" bIns="45720" numCol="1" anchor="ctr">
             <a:noAutofit/>
           </a:bodyPr>
           <a:lstStyle/>
@@ -7302,15 +6914,7 @@
                 <a:ea typeface="맑은 고딕" charset="0"/>
                 <a:cs typeface="Arial" charset="0"/>
               </a:rPr>
-              <a:t>프로젝트</a:t>
-            </a:r>
-            <a:r>
-              <a:rPr lang="en-US" altLang="ko-KR" sz="3600" b="1">
-                <a:latin typeface="Arial" charset="0"/>
-                <a:ea typeface="맑은 고딕" charset="0"/>
-                <a:cs typeface="Arial" charset="0"/>
-              </a:rPr>
-              <a:t> 목적 소개</a:t>
+              <a:t>프로젝트 목적 소개</a:t>
             </a:r>
             <a:endParaRPr lang="ko-KR" altLang="en-US" sz="3600" b="1">
               <a:latin typeface="Arial" charset="0"/>
@@ -7324,21 +6928,23 @@
         <p:nvSpPr>
           <p:cNvPr id="2" name="Content Placeholder 1"/>
           <p:cNvSpPr txBox="1">
-            <a:spLocks/>
-          </p:cNvSpPr>
-          <p:nvPr>
-            <p:ph type="obj" idx="1"/>
-          </p:nvPr>
-        </p:nvSpPr>
-        <p:spPr>
-          <a:xfrm rot="0">
+            <a:spLocks noGrp="1"/>
+          </p:cNvSpPr>
+          <p:nvPr>
+            <p:ph idx="1"/>
+          </p:nvPr>
+        </p:nvSpPr>
+        <p:spPr>
+          <a:xfrm>
             <a:off x="1979930" y="987425"/>
             <a:ext cx="6913245" cy="461010"/>
           </a:xfrm>
-          <a:prstGeom prst="rect"/>
-        </p:spPr>
-        <p:txBody>
-          <a:bodyPr wrap="square" lIns="91440" tIns="45720" rIns="91440" bIns="45720" numCol="1" vert="horz" anchor="ctr">
+          <a:prstGeom prst="rect">
+            <a:avLst/>
+          </a:prstGeom>
+        </p:spPr>
+        <p:txBody>
+          <a:bodyPr vert="horz" wrap="square" lIns="91440" tIns="45720" rIns="91440" bIns="45720" numCol="1" anchor="ctr">
             <a:noAutofit/>
           </a:bodyPr>
           <a:lstStyle/>
@@ -7353,50 +6959,29 @@
                 <a:ea typeface="맑은 고딕" charset="0"/>
                 <a:cs typeface="+mn-cs"/>
               </a:rPr>
-              <a:t>–</a:t>
-            </a:r>
+              <a:t>– </a:t>
+            </a:r>
+            <a:r>
+              <a:rPr lang="ko-KR" altLang="en-US" sz="1400" b="1">
+                <a:latin typeface="맑은 고딕" charset="0"/>
+                <a:ea typeface="맑은 고딕" charset="0"/>
+                <a:cs typeface="+mn-cs"/>
+              </a:rPr>
+              <a:t>간단한 데모에 다양한 AA를 직접 적용</a:t>
+            </a:r>
+          </a:p>
+          <a:p>
+            <a:pPr marL="0" indent="0" latinLnBrk="0">
+              <a:buFontTx/>
+              <a:buNone/>
+            </a:pPr>
             <a:r>
               <a:rPr lang="en-US" altLang="ko-KR" sz="1400" b="1">
                 <a:latin typeface="맑은 고딕" charset="0"/>
                 <a:ea typeface="맑은 고딕" charset="0"/>
                 <a:cs typeface="+mn-cs"/>
               </a:rPr>
-              <a:t> </a:t>
-            </a:r>
-            <a:r>
-              <a:rPr lang="ko-KR" altLang="en-US" sz="1400" b="1">
-                <a:latin typeface="맑은 고딕" charset="0"/>
-                <a:ea typeface="맑은 고딕" charset="0"/>
-                <a:cs typeface="+mn-cs"/>
-              </a:rPr>
-              <a:t>간단한 데모에 다양한 AA를 직접 적용</a:t>
-            </a:r>
-            <a:endParaRPr lang="ko-KR" altLang="en-US" sz="1400" b="1">
-              <a:latin typeface="맑은 고딕" charset="0"/>
-              <a:ea typeface="맑은 고딕" charset="0"/>
-              <a:cs typeface="+mn-cs"/>
-            </a:endParaRPr>
-          </a:p>
-          <a:p>
-            <a:pPr marL="0" indent="0" latinLnBrk="0">
-              <a:buFontTx/>
-              <a:buNone/>
-            </a:pPr>
-            <a:r>
-              <a:rPr lang="en-US" altLang="ko-KR" sz="1400" b="1">
-                <a:latin typeface="맑은 고딕" charset="0"/>
-                <a:ea typeface="맑은 고딕" charset="0"/>
-                <a:cs typeface="+mn-cs"/>
-              </a:rPr>
-              <a:t>–</a:t>
-            </a:r>
-            <a:r>
-              <a:rPr lang="en-US" altLang="ko-KR" sz="1400" b="1">
-                <a:latin typeface="맑은 고딕" charset="0"/>
-                <a:ea typeface="맑은 고딕" charset="0"/>
-                <a:cs typeface="+mn-cs"/>
-              </a:rPr>
-              <a:t> 기존 기법을 개선 시도하여 컴퓨터 그래픽스에 대한 이해를 높이고자 함</a:t>
+              <a:t>– 기존 기법을 개선 시도하여 컴퓨터 그래픽스에 대한 이해를 높이고자 함</a:t>
             </a:r>
             <a:endParaRPr lang="ko-KR" altLang="en-US" sz="1400" b="1">
               <a:latin typeface="맑은 고딕" charset="0"/>
@@ -7427,11 +7012,13 @@
           </a:stretch>
         </p:blipFill>
         <p:spPr>
-          <a:xfrm rot="0">
+          <a:xfrm>
             <a:off x="2146935" y="1509395"/>
             <a:ext cx="5744210" cy="3429635"/>
           </a:xfrm>
-          <a:prstGeom prst="rect"/>
+          <a:prstGeom prst="rect">
+            <a:avLst/>
+          </a:prstGeom>
           <a:noFill/>
         </p:spPr>
       </p:pic>
@@ -7440,21 +7027,6 @@
   <p:clrMapOvr>
     <a:masterClrMapping/>
   </p:clrMapOvr>
-  <mc:AlternateContent xmlns:mc="http://schemas.openxmlformats.org/markup-compatibility/2006">
-    <mc:Choice xmlns:p14="http://schemas.microsoft.com/office/powerpoint/2010/main" Requires="p14">
-      <p:transition spd="slow" p14:dur="2000"/>
-    </mc:Choice>
-    <mc:Fallback>
-      <p:transition spd="slow"/>
-    </mc:Fallback>
-  </mc:AlternateContent>
-  <p:timing>
-    <p:tnLst>
-      <p:par>
-        <p:cTn id="1" dur="indefinite" restart="never" nodeType="tmRoot"/>
-      </p:par>
-    </p:tnLst>
-  </p:timing>
 </p:sld>
 </file>
 
@@ -7479,21 +7051,23 @@
         <p:nvSpPr>
           <p:cNvPr id="3" name="Title 2"/>
           <p:cNvSpPr txBox="1">
-            <a:spLocks/>
+            <a:spLocks noGrp="1"/>
           </p:cNvSpPr>
           <p:nvPr>
             <p:ph type="title"/>
           </p:nvPr>
         </p:nvSpPr>
         <p:spPr>
-          <a:xfrm rot="0">
+          <a:xfrm>
             <a:off x="1619885" y="0"/>
             <a:ext cx="7524749" cy="885190"/>
           </a:xfrm>
-          <a:prstGeom prst="rect"/>
-        </p:spPr>
-        <p:txBody>
-          <a:bodyPr wrap="square" lIns="91440" tIns="45720" rIns="91440" bIns="45720" numCol="1" vert="horz" anchor="ctr">
+          <a:prstGeom prst="rect">
+            <a:avLst/>
+          </a:prstGeom>
+        </p:spPr>
+        <p:txBody>
+          <a:bodyPr vert="horz" wrap="square" lIns="91440" tIns="45720" rIns="91440" bIns="45720" numCol="1" anchor="ctr">
             <a:noAutofit/>
           </a:bodyPr>
           <a:lstStyle/>
@@ -7508,15 +7082,7 @@
                 <a:ea typeface="맑은 고딕" charset="0"/>
                 <a:cs typeface="Arial" charset="0"/>
               </a:rPr>
-              <a:t>프로젝트</a:t>
-            </a:r>
-            <a:r>
-              <a:rPr lang="en-US" altLang="ko-KR" sz="3600" b="1">
-                <a:latin typeface="Arial" charset="0"/>
-                <a:ea typeface="맑은 고딕" charset="0"/>
-                <a:cs typeface="Arial" charset="0"/>
-              </a:rPr>
-              <a:t> 목적 변경</a:t>
+              <a:t>프로젝트 목적 변경</a:t>
             </a:r>
             <a:endParaRPr lang="ko-KR" altLang="en-US" sz="3600" b="1">
               <a:latin typeface="Arial" charset="0"/>
@@ -7530,21 +7096,23 @@
         <p:nvSpPr>
           <p:cNvPr id="2" name="Content Placeholder 1"/>
           <p:cNvSpPr txBox="1">
-            <a:spLocks/>
-          </p:cNvSpPr>
-          <p:nvPr>
-            <p:ph type="obj" idx="1"/>
-          </p:nvPr>
-        </p:nvSpPr>
-        <p:spPr>
-          <a:xfrm rot="0">
+            <a:spLocks noGrp="1"/>
+          </p:cNvSpPr>
+          <p:nvPr>
+            <p:ph idx="1"/>
+          </p:nvPr>
+        </p:nvSpPr>
+        <p:spPr>
+          <a:xfrm>
             <a:off x="1979930" y="979805"/>
             <a:ext cx="6913245" cy="461010"/>
           </a:xfrm>
-          <a:prstGeom prst="rect"/>
-        </p:spPr>
-        <p:txBody>
-          <a:bodyPr wrap="square" lIns="91440" tIns="45720" rIns="91440" bIns="45720" numCol="1" vert="horz" anchor="ctr">
+          <a:prstGeom prst="rect">
+            <a:avLst/>
+          </a:prstGeom>
+        </p:spPr>
+        <p:txBody>
+          <a:bodyPr vert="horz" wrap="square" lIns="91440" tIns="45720" rIns="91440" bIns="45720" numCol="1" anchor="ctr">
             <a:noAutofit/>
           </a:bodyPr>
           <a:lstStyle/>
@@ -7559,15 +7127,7 @@
                 <a:ea typeface="맑은 고딕" charset="0"/>
                 <a:cs typeface="+mn-cs"/>
               </a:rPr>
-              <a:t>–</a:t>
-            </a:r>
-            <a:r>
-              <a:rPr lang="en-US" altLang="ko-KR" sz="1400" b="1">
-                <a:latin typeface="맑은 고딕" charset="0"/>
-                <a:ea typeface="맑은 고딕" charset="0"/>
-                <a:cs typeface="+mn-cs"/>
-              </a:rPr>
-              <a:t> </a:t>
+              <a:t>– </a:t>
             </a:r>
             <a:r>
               <a:rPr lang="ko-KR" altLang="en-US" sz="1400" b="1">
@@ -7577,11 +7137,6 @@
               </a:rPr>
               <a:t>기존 기법 구현이 예상보다 늦어짐</a:t>
             </a:r>
-            <a:endParaRPr lang="ko-KR" altLang="en-US" sz="1400" b="1">
-              <a:latin typeface="맑은 고딕" charset="0"/>
-              <a:ea typeface="맑은 고딕" charset="0"/>
-              <a:cs typeface="+mn-cs"/>
-            </a:endParaRPr>
           </a:p>
           <a:p>
             <a:pPr marL="0" indent="0" latinLnBrk="0">
@@ -7625,11 +7180,13 @@
           </a:stretch>
         </p:blipFill>
         <p:spPr>
-          <a:xfrm rot="0">
+          <a:xfrm>
             <a:off x="1783080" y="1597025"/>
             <a:ext cx="4505960" cy="3429635"/>
           </a:xfrm>
-          <a:prstGeom prst="rect"/>
+          <a:prstGeom prst="rect">
+            <a:avLst/>
+          </a:prstGeom>
           <a:noFill/>
         </p:spPr>
       </p:pic>
@@ -7654,11 +7211,13 @@
           </a:stretch>
         </p:blipFill>
         <p:spPr>
-          <a:xfrm rot="0">
+          <a:xfrm>
             <a:off x="6394450" y="1597025"/>
             <a:ext cx="2581910" cy="3429635"/>
           </a:xfrm>
-          <a:prstGeom prst="rect"/>
+          <a:prstGeom prst="rect">
+            <a:avLst/>
+          </a:prstGeom>
           <a:noFill/>
         </p:spPr>
       </p:pic>
@@ -7667,21 +7226,6 @@
   <p:clrMapOvr>
     <a:masterClrMapping/>
   </p:clrMapOvr>
-  <mc:AlternateContent xmlns:mc="http://schemas.openxmlformats.org/markup-compatibility/2006">
-    <mc:Choice xmlns:p14="http://schemas.microsoft.com/office/powerpoint/2010/main" Requires="p14">
-      <p:transition spd="slow" p14:dur="2000"/>
-    </mc:Choice>
-    <mc:Fallback>
-      <p:transition spd="slow"/>
-    </mc:Fallback>
-  </mc:AlternateContent>
-  <p:timing>
-    <p:tnLst>
-      <p:par>
-        <p:cTn id="1" dur="indefinite" restart="never" nodeType="tmRoot"/>
-      </p:par>
-    </p:tnLst>
-  </p:timing>
 </p:sld>
 </file>
 
@@ -7706,21 +7250,23 @@
         <p:nvSpPr>
           <p:cNvPr id="3" name="Title 2"/>
           <p:cNvSpPr txBox="1">
-            <a:spLocks/>
+            <a:spLocks noGrp="1"/>
           </p:cNvSpPr>
           <p:nvPr>
             <p:ph type="title"/>
           </p:nvPr>
         </p:nvSpPr>
         <p:spPr>
-          <a:xfrm rot="0">
+          <a:xfrm>
             <a:off x="1619885" y="0"/>
             <a:ext cx="7524749" cy="885190"/>
           </a:xfrm>
-          <a:prstGeom prst="rect"/>
-        </p:spPr>
-        <p:txBody>
-          <a:bodyPr wrap="square" lIns="91440" tIns="45720" rIns="91440" bIns="45720" numCol="1" vert="horz" anchor="ctr">
+          <a:prstGeom prst="rect">
+            <a:avLst/>
+          </a:prstGeom>
+        </p:spPr>
+        <p:txBody>
+          <a:bodyPr vert="horz" wrap="square" lIns="91440" tIns="45720" rIns="91440" bIns="45720" numCol="1" anchor="ctr">
             <a:noAutofit/>
           </a:bodyPr>
           <a:lstStyle/>
@@ -7735,15 +7281,7 @@
                 <a:ea typeface="맑은 고딕" charset="0"/>
                 <a:cs typeface="Arial" charset="0"/>
               </a:rPr>
-              <a:t>Anti</a:t>
-            </a:r>
-            <a:r>
-              <a:rPr lang="en-US" altLang="ko-KR" sz="3600" b="1">
-                <a:latin typeface="Arial" charset="0"/>
-                <a:ea typeface="맑은 고딕" charset="0"/>
-                <a:cs typeface="Arial" charset="0"/>
-              </a:rPr>
-              <a:t> Aliasing </a:t>
+              <a:t>Anti Aliasing </a:t>
             </a:r>
             <a:r>
               <a:rPr lang="ko-KR" altLang="en-US" sz="3600" b="1">
@@ -7791,11 +7329,13 @@
           </a:stretch>
         </p:blipFill>
         <p:spPr>
-          <a:xfrm rot="0">
+          <a:xfrm>
             <a:off x="1692275" y="1551305"/>
             <a:ext cx="3281045" cy="3792854"/>
           </a:xfrm>
-          <a:prstGeom prst="rect"/>
+          <a:prstGeom prst="rect">
+            <a:avLst/>
+          </a:prstGeom>
           <a:noFill/>
         </p:spPr>
       </p:pic>
@@ -7803,21 +7343,23 @@
         <p:nvSpPr>
           <p:cNvPr id="2" name="Content Placeholder 1"/>
           <p:cNvSpPr txBox="1">
-            <a:spLocks/>
-          </p:cNvSpPr>
-          <p:nvPr>
-            <p:ph type="obj" idx="1"/>
-          </p:nvPr>
-        </p:nvSpPr>
-        <p:spPr>
-          <a:xfrm rot="0">
+            <a:spLocks noGrp="1"/>
+          </p:cNvSpPr>
+          <p:nvPr>
+            <p:ph idx="1"/>
+          </p:nvPr>
+        </p:nvSpPr>
+        <p:spPr>
+          <a:xfrm>
             <a:off x="1979930" y="987425"/>
             <a:ext cx="6913245" cy="461010"/>
           </a:xfrm>
-          <a:prstGeom prst="rect"/>
-        </p:spPr>
-        <p:txBody>
-          <a:bodyPr wrap="square" lIns="91440" tIns="45720" rIns="91440" bIns="45720" numCol="1" vert="horz" anchor="ctr">
+          <a:prstGeom prst="rect">
+            <a:avLst/>
+          </a:prstGeom>
+        </p:spPr>
+        <p:txBody>
+          <a:bodyPr vert="horz" wrap="square" lIns="91440" tIns="45720" rIns="91440" bIns="45720" numCol="1" anchor="ctr">
             <a:noAutofit/>
           </a:bodyPr>
           <a:lstStyle/>
@@ -7832,15 +7374,7 @@
                 <a:ea typeface="맑은 고딕" charset="0"/>
                 <a:cs typeface="+mn-cs"/>
               </a:rPr>
-              <a:t>–</a:t>
-            </a:r>
-            <a:r>
-              <a:rPr lang="en-US" altLang="ko-KR" sz="1400" b="1">
-                <a:latin typeface="맑은 고딕" charset="0"/>
-                <a:ea typeface="맑은 고딕" charset="0"/>
-                <a:cs typeface="+mn-cs"/>
-              </a:rPr>
-              <a:t> </a:t>
+              <a:t>– </a:t>
             </a:r>
             <a:r>
               <a:rPr lang="ko-KR" altLang="en-US" sz="1400" b="1">
@@ -7875,15 +7409,7 @@
                 <a:ea typeface="맑은 고딕" charset="0"/>
                 <a:cs typeface="+mn-cs"/>
               </a:rPr>
-              <a:t>–</a:t>
-            </a:r>
-            <a:r>
-              <a:rPr lang="en-US" altLang="ko-KR" sz="1400" b="1">
-                <a:latin typeface="맑은 고딕" charset="0"/>
-                <a:ea typeface="맑은 고딕" charset="0"/>
-                <a:cs typeface="+mn-cs"/>
-              </a:rPr>
-              <a:t> Rasterizer가 vertex data를 해상도에 맞게 fragment로 바꾸는 과정에서 발생</a:t>
+              <a:t>– Rasterizer가 vertex data를 해상도에 맞게 fragment로 바꾸는 과정에서 발생</a:t>
             </a:r>
             <a:endParaRPr lang="ko-KR" altLang="en-US" sz="1400" b="1">
               <a:latin typeface="맑은 고딕" charset="0"/>
@@ -7914,11 +7440,13 @@
           </a:stretch>
         </p:blipFill>
         <p:spPr>
-          <a:xfrm rot="0">
+          <a:xfrm>
             <a:off x="5796280" y="2428240"/>
             <a:ext cx="3116580" cy="1562735"/>
           </a:xfrm>
-          <a:prstGeom prst="rect"/>
+          <a:prstGeom prst="rect">
+            <a:avLst/>
+          </a:prstGeom>
           <a:noFill/>
         </p:spPr>
       </p:pic>
@@ -7926,21 +7454,23 @@
         <p:nvSpPr>
           <p:cNvPr id="5" name="Content Placeholder 4"/>
           <p:cNvSpPr txBox="1">
-            <a:spLocks/>
-          </p:cNvSpPr>
-          <p:nvPr>
-            <p:ph type="obj" idx="10"/>
-          </p:nvPr>
-        </p:nvSpPr>
-        <p:spPr>
-          <a:xfrm rot="0">
+            <a:spLocks noGrp="1"/>
+          </p:cNvSpPr>
+          <p:nvPr>
+            <p:ph idx="10"/>
+          </p:nvPr>
+        </p:nvSpPr>
+        <p:spPr>
+          <a:xfrm>
             <a:off x="4672965" y="1664335"/>
             <a:ext cx="4230370" cy="2996565"/>
           </a:xfrm>
-          <a:prstGeom prst="rect"/>
-        </p:spPr>
-        <p:txBody>
-          <a:bodyPr wrap="square" lIns="396240" tIns="45720" rIns="91440" bIns="45720" numCol="1" vert="horz" anchor="t">
+          <a:prstGeom prst="rect">
+            <a:avLst/>
+          </a:prstGeom>
+        </p:spPr>
+        <p:txBody>
+          <a:bodyPr vert="horz" wrap="square" lIns="396240" tIns="45720" rIns="91440" bIns="45720" numCol="1" anchor="t">
             <a:noAutofit/>
           </a:bodyPr>
           <a:lstStyle/>
@@ -8029,11 +7559,6 @@
               </a:rPr>
               <a:t>가짐</a:t>
             </a:r>
-            <a:endParaRPr lang="ko-KR" altLang="en-US" sz="1400">
-              <a:latin typeface="Arial" charset="0"/>
-              <a:ea typeface="맑은 고딕" charset="0"/>
-              <a:cs typeface="Arial" charset="0"/>
-            </a:endParaRPr>
           </a:p>
           <a:p>
             <a:pPr marL="0" indent="0" latinLnBrk="0">
@@ -8046,15 +7571,7 @@
                 <a:ea typeface="맑은 고딕" charset="0"/>
                 <a:cs typeface="Arial" charset="0"/>
               </a:rPr>
-              <a:t>픽셀</a:t>
-            </a:r>
-            <a:r>
-              <a:rPr lang="en-US" altLang="ko-KR" sz="1400">
-                <a:latin typeface="Arial" charset="0"/>
-                <a:ea typeface="맑은 고딕" charset="0"/>
-                <a:cs typeface="Arial" charset="0"/>
-              </a:rPr>
-              <a:t> 단위의 계단 현상을 없애 주는 기</a:t>
+              <a:t>픽셀 단위의 계단 현상을 없애 주는 기</a:t>
             </a:r>
             <a:r>
               <a:rPr lang="ko-KR" altLang="en-US" sz="1400">
@@ -8064,11 +7581,6 @@
               </a:rPr>
               <a:t>법들</a:t>
             </a:r>
-            <a:endParaRPr lang="ko-KR" altLang="en-US" sz="1400">
-              <a:latin typeface="Arial" charset="0"/>
-              <a:ea typeface="맑은 고딕" charset="0"/>
-              <a:cs typeface="Arial" charset="0"/>
-            </a:endParaRPr>
           </a:p>
           <a:p>
             <a:pPr marL="0" indent="0" latinLnBrk="0">
@@ -8094,14 +7606,6 @@
               </a:rPr>
               <a:t>FXAA</a:t>
             </a:r>
-            <a:r>
-              <a:rPr lang="en-US" altLang="ko-KR" sz="1400">
-                <a:latin typeface="Arial" charset="0"/>
-                <a:ea typeface="맑은 고딕" charset="0"/>
-                <a:cs typeface="Arial" charset="0"/>
-              </a:rPr>
-              <a:t/>
-            </a:r>
             <a:br>
               <a:rPr lang="en-US" altLang="ko-KR" sz="1400">
                 <a:latin typeface="Arial" charset="0"/>
@@ -8187,26 +7691,11 @@
   <p:clrMapOvr>
     <a:masterClrMapping/>
   </p:clrMapOvr>
-  <mc:AlternateContent xmlns:mc="http://schemas.openxmlformats.org/markup-compatibility/2006">
-    <mc:Choice xmlns:p14="http://schemas.microsoft.com/office/powerpoint/2010/main" Requires="p14">
-      <p:transition spd="slow" p14:dur="2000"/>
-    </mc:Choice>
-    <mc:Fallback>
-      <p:transition spd="slow"/>
-    </mc:Fallback>
-  </mc:AlternateContent>
-  <p:timing>
-    <p:tnLst>
-      <p:par>
-        <p:cTn id="1" dur="indefinite" restart="never" nodeType="tmRoot"/>
-      </p:par>
-    </p:tnLst>
-  </p:timing>
 </p:sld>
 </file>
 
 <file path=ppt/slides/slide6.xml><?xml version="1.0" encoding="utf-8"?>
-<p:sld xmlns:a="http://schemas.openxmlformats.org/drawingml/2006/main" xmlns:r="http://schemas.openxmlformats.org/officeDocument/2006/relationships" xmlns:p="http://schemas.openxmlformats.org/presentationml/2006/main" xmlns:p14="http://schemas.microsoft.com/office/powerpoint/2010/main">
+<p:sld xmlns:a="http://schemas.openxmlformats.org/drawingml/2006/main" xmlns:r="http://schemas.openxmlformats.org/officeDocument/2006/relationships" xmlns:p="http://schemas.openxmlformats.org/presentationml/2006/main">
   <p:cSld>
     <p:spTree>
       <p:nvGrpSpPr>
@@ -8243,10 +7732,9 @@
           <a:lstStyle/>
           <a:p>
             <a:r>
-              <a:rPr lang="en-US" dirty="0" smtClean="0"/>
+              <a:rPr lang="en-US" dirty="0"/>
               <a:t>Sample Scene - Container</a:t>
             </a:r>
-            <a:endParaRPr lang="en-US" dirty="0" smtClean="0"/>
           </a:p>
         </p:txBody>
       </p:sp>
@@ -8324,13 +7812,8 @@
             </a:r>
             <a:r>
               <a:rPr lang="ko-KR" altLang="en-US" sz="1400" b="1" dirty="0"/>
-              <a:t>확</a:t>
-            </a:r>
-            <a:r>
-              <a:rPr lang="ko-KR" altLang="en-US" sz="1400" b="1" dirty="0"/>
-              <a:t>대</a:t>
-            </a:r>
-            <a:endParaRPr lang="ko-KR" altLang="en-US" sz="1400" b="1" dirty="0"/>
+              <a:t>확대</a:t>
+            </a:r>
           </a:p>
         </p:txBody>
       </p:sp>
@@ -8338,14 +7821,14 @@
         <p:nvPicPr>
           <p:cNvPr id="8" name="Content Placeholder 7"/>
           <p:cNvPicPr>
-            <a:picLocks noChangeAspect="1"/>
+            <a:picLocks noGrp="1" noChangeAspect="1"/>
           </p:cNvPicPr>
           <p:nvPr>
             <p:ph idx="10"/>
           </p:nvPr>
         </p:nvPicPr>
         <p:blipFill>
-          <a:blip r:embed="rId1"/>
+          <a:blip r:embed="rId2"/>
           <a:stretch>
             <a:fillRect/>
           </a:stretch>
@@ -8369,7 +7852,7 @@
           <p:nvPr/>
         </p:nvPicPr>
         <p:blipFill>
-          <a:blip r:embed="rId2"/>
+          <a:blip r:embed="rId3"/>
           <a:srcRect/>
           <a:stretch>
             <a:fillRect/>
@@ -8405,6 +7888,7 @@
           <a:bodyPr wrap="none" rtlCol="0">
             <a:spAutoFit/>
           </a:bodyPr>
+          <a:lstStyle/>
           <a:p>
             <a:r>
               <a:rPr lang="en-US" sz="2400">
@@ -8413,10 +7897,6 @@
               </a:rPr>
               <a:t>→</a:t>
             </a:r>
-            <a:endParaRPr lang="en-US" sz="2400">
-              <a:latin typeface="Arial" panose="020B0604020202020204" pitchFamily="34" charset="0"/>
-              <a:cs typeface="Arial" panose="020B0604020202020204" pitchFamily="34" charset="0"/>
-            </a:endParaRPr>
           </a:p>
         </p:txBody>
       </p:sp>
@@ -8425,26 +7905,11 @@
   <p:clrMapOvr>
     <a:masterClrMapping/>
   </p:clrMapOvr>
-  <mc:AlternateContent xmlns:mc="http://schemas.openxmlformats.org/markup-compatibility/2006">
-    <mc:Choice xmlns:p14="http://schemas.microsoft.com/office/powerpoint/2010/main" Requires="p14">
-      <p:transition spd="slow" p14:dur="2000"/>
-    </mc:Choice>
-    <mc:Fallback>
-      <p:transition spd="slow"/>
-    </mc:Fallback>
-  </mc:AlternateContent>
-  <p:timing>
-    <p:tnLst>
-      <p:par>
-        <p:cTn id="1" dur="indefinite" restart="never" nodeType="tmRoot"/>
-      </p:par>
-    </p:tnLst>
-  </p:timing>
 </p:sld>
 </file>
 
 <file path=ppt/slides/slide7.xml><?xml version="1.0" encoding="utf-8"?>
-<p:sld xmlns:a="http://schemas.openxmlformats.org/drawingml/2006/main" xmlns:r="http://schemas.openxmlformats.org/officeDocument/2006/relationships" xmlns:p="http://schemas.openxmlformats.org/presentationml/2006/main" xmlns:p14="http://schemas.microsoft.com/office/powerpoint/2010/main">
+<p:sld xmlns:a="http://schemas.openxmlformats.org/drawingml/2006/main" xmlns:r="http://schemas.openxmlformats.org/officeDocument/2006/relationships" xmlns:p="http://schemas.openxmlformats.org/presentationml/2006/main">
   <p:cSld>
     <p:spTree>
       <p:nvGrpSpPr>
@@ -8481,10 +7946,9 @@
           <a:lstStyle/>
           <a:p>
             <a:r>
-              <a:rPr lang="en-US" altLang="ko-KR" dirty="0" smtClean="0"/>
+              <a:rPr lang="en-US" altLang="ko-KR" dirty="0"/>
               <a:t> FXAA</a:t>
             </a:r>
-            <a:endParaRPr lang="en-US" altLang="ko-KR" dirty="0" smtClean="0"/>
           </a:p>
         </p:txBody>
       </p:sp>
@@ -8512,7 +7976,6 @@
               <a:rPr lang="en-US" altLang="ko-KR" b="1" dirty="0"/>
               <a:t>Fast approXimate Anti Aliasing</a:t>
             </a:r>
-            <a:endParaRPr lang="en-US" altLang="ko-KR" b="1" dirty="0"/>
           </a:p>
         </p:txBody>
       </p:sp>
@@ -8543,10 +8006,6 @@
               </a:rPr>
               <a:t>엔비디아에서 만든, Single-pass shader 상에서 edge를 판단하여 이를 부드럽게 (blur) 처리하는 방법</a:t>
             </a:r>
-            <a:endParaRPr lang="en-US" altLang="ko-KR" dirty="0">
-              <a:latin typeface="Arial" panose="020B0604020202020204" pitchFamily="34" charset="0"/>
-              <a:cs typeface="Arial" panose="020B0604020202020204" pitchFamily="34" charset="0"/>
-            </a:endParaRPr>
           </a:p>
           <a:p>
             <a:r>
@@ -8556,41 +8015,12 @@
               </a:rPr>
               <a:t>– 속도가 빠르지만 edge가 아닌 부분(텍스처 내부나 font 등)도 흐려질 수 있음</a:t>
             </a:r>
-            <a:endParaRPr lang="en-US" altLang="ko-KR" dirty="0">
-              <a:latin typeface="Arial" panose="020B0604020202020204" pitchFamily="34" charset="0"/>
-              <a:cs typeface="Arial" panose="020B0604020202020204" pitchFamily="34" charset="0"/>
-            </a:endParaRPr>
           </a:p>
         </p:txBody>
       </p:sp>
       <p:pic>
         <p:nvPicPr>
           <p:cNvPr id="4" name="Picture 3"/>
-          <p:cNvPicPr>
-            <a:picLocks noChangeAspect="1"/>
-          </p:cNvPicPr>
-          <p:nvPr/>
-        </p:nvPicPr>
-        <p:blipFill>
-          <a:blip r:embed="rId1"/>
-          <a:srcRect/>
-          <a:stretch>
-            <a:fillRect/>
-          </a:stretch>
-        </p:blipFill>
-        <p:spPr>
-          <a:xfrm>
-            <a:off x="2579370" y="2067560"/>
-            <a:ext cx="2294890" cy="2379345"/>
-          </a:xfrm>
-          <a:prstGeom prst="rect">
-            <a:avLst/>
-          </a:prstGeom>
-        </p:spPr>
-      </p:pic>
-      <p:pic>
-        <p:nvPicPr>
-          <p:cNvPr id="6" name="Picture 5"/>
           <p:cNvPicPr>
             <a:picLocks noChangeAspect="1"/>
           </p:cNvPicPr>
@@ -8605,6 +8035,31 @@
         </p:blipFill>
         <p:spPr>
           <a:xfrm>
+            <a:off x="2579370" y="2067560"/>
+            <a:ext cx="2294890" cy="2379345"/>
+          </a:xfrm>
+          <a:prstGeom prst="rect">
+            <a:avLst/>
+          </a:prstGeom>
+        </p:spPr>
+      </p:pic>
+      <p:pic>
+        <p:nvPicPr>
+          <p:cNvPr id="6" name="Picture 5"/>
+          <p:cNvPicPr>
+            <a:picLocks noChangeAspect="1"/>
+          </p:cNvPicPr>
+          <p:nvPr/>
+        </p:nvPicPr>
+        <p:blipFill>
+          <a:blip r:embed="rId3"/>
+          <a:srcRect/>
+          <a:stretch>
+            <a:fillRect/>
+          </a:stretch>
+        </p:blipFill>
+        <p:spPr>
+          <a:xfrm>
             <a:off x="5819775" y="2067560"/>
             <a:ext cx="2294890" cy="2379345"/>
           </a:xfrm>
@@ -8633,12 +8088,12 @@
           <a:bodyPr wrap="none" rtlCol="0">
             <a:spAutoFit/>
           </a:bodyPr>
+          <a:lstStyle/>
           <a:p>
             <a:r>
               <a:rPr lang="en-US"/>
               <a:t>Before</a:t>
             </a:r>
-            <a:endParaRPr lang="en-US"/>
           </a:p>
         </p:txBody>
       </p:sp>
@@ -8662,12 +8117,12 @@
           <a:bodyPr wrap="none" rtlCol="0">
             <a:spAutoFit/>
           </a:bodyPr>
+          <a:lstStyle/>
           <a:p>
             <a:r>
               <a:rPr lang="en-US"/>
               <a:t>After</a:t>
             </a:r>
-            <a:endParaRPr lang="en-US"/>
           </a:p>
         </p:txBody>
       </p:sp>
@@ -8676,26 +8131,11 @@
   <p:clrMapOvr>
     <a:masterClrMapping/>
   </p:clrMapOvr>
-  <mc:AlternateContent xmlns:mc="http://schemas.openxmlformats.org/markup-compatibility/2006">
-    <mc:Choice xmlns:p14="http://schemas.microsoft.com/office/powerpoint/2010/main" Requires="p14">
-      <p:transition spd="slow" p14:dur="2000"/>
-    </mc:Choice>
-    <mc:Fallback>
-      <p:transition spd="slow"/>
-    </mc:Fallback>
-  </mc:AlternateContent>
-  <p:timing>
-    <p:tnLst>
-      <p:par>
-        <p:cTn id="1" dur="indefinite" restart="never" nodeType="tmRoot"/>
-      </p:par>
-    </p:tnLst>
-  </p:timing>
 </p:sld>
 </file>
 
 <file path=ppt/slides/slide8.xml><?xml version="1.0" encoding="utf-8"?>
-<p:sld xmlns:a="http://schemas.openxmlformats.org/drawingml/2006/main" xmlns:r="http://schemas.openxmlformats.org/officeDocument/2006/relationships" xmlns:p="http://schemas.openxmlformats.org/presentationml/2006/main" xmlns:p14="http://schemas.microsoft.com/office/powerpoint/2010/main">
+<p:sld xmlns:a="http://schemas.openxmlformats.org/drawingml/2006/main" xmlns:r="http://schemas.openxmlformats.org/officeDocument/2006/relationships" xmlns:p="http://schemas.openxmlformats.org/presentationml/2006/main">
   <p:cSld>
     <p:spTree>
       <p:nvGrpSpPr>
@@ -8732,10 +8172,9 @@
           <a:lstStyle/>
           <a:p>
             <a:r>
-              <a:rPr lang="en-US" altLang="ko-KR" dirty="0" smtClean="0"/>
+              <a:rPr lang="en-US" altLang="ko-KR" dirty="0"/>
               <a:t> MSAA</a:t>
             </a:r>
-            <a:endParaRPr lang="en-US" altLang="ko-KR" dirty="0" smtClean="0"/>
           </a:p>
         </p:txBody>
       </p:sp>
@@ -8763,7 +8202,6 @@
               <a:rPr lang="en-US" altLang="ko-KR" b="1" dirty="0"/>
               <a:t>MultiSample Anti Aliasing</a:t>
             </a:r>
-            <a:endParaRPr lang="en-US" altLang="ko-KR" b="1" dirty="0"/>
           </a:p>
         </p:txBody>
       </p:sp>
@@ -8801,10 +8239,6 @@
               </a:rPr>
               <a:t>식</a:t>
             </a:r>
-            <a:endParaRPr lang="ko-KR" dirty="0">
-              <a:latin typeface="Arial" panose="020B0604020202020204" pitchFamily="34" charset="0"/>
-              <a:cs typeface="Arial" panose="020B0604020202020204" pitchFamily="34" charset="0"/>
-            </a:endParaRPr>
           </a:p>
           <a:p>
             <a:r>
@@ -8865,31 +8299,6 @@
       <p:pic>
         <p:nvPicPr>
           <p:cNvPr id="16" name="Picture 15"/>
-          <p:cNvPicPr>
-            <a:picLocks noChangeAspect="1"/>
-          </p:cNvPicPr>
-          <p:nvPr/>
-        </p:nvPicPr>
-        <p:blipFill>
-          <a:blip r:embed="rId1"/>
-          <a:srcRect/>
-          <a:stretch>
-            <a:fillRect/>
-          </a:stretch>
-        </p:blipFill>
-        <p:spPr>
-          <a:xfrm>
-            <a:off x="2579370" y="2067560"/>
-            <a:ext cx="2294890" cy="2379345"/>
-          </a:xfrm>
-          <a:prstGeom prst="rect">
-            <a:avLst/>
-          </a:prstGeom>
-        </p:spPr>
-      </p:pic>
-      <p:pic>
-        <p:nvPicPr>
-          <p:cNvPr id="17" name="Picture 16"/>
           <p:cNvPicPr>
             <a:picLocks noChangeAspect="1"/>
           </p:cNvPicPr>
@@ -8904,6 +8313,31 @@
         </p:blipFill>
         <p:spPr>
           <a:xfrm>
+            <a:off x="2579370" y="2067560"/>
+            <a:ext cx="2294890" cy="2379345"/>
+          </a:xfrm>
+          <a:prstGeom prst="rect">
+            <a:avLst/>
+          </a:prstGeom>
+        </p:spPr>
+      </p:pic>
+      <p:pic>
+        <p:nvPicPr>
+          <p:cNvPr id="17" name="Picture 16"/>
+          <p:cNvPicPr>
+            <a:picLocks noChangeAspect="1"/>
+          </p:cNvPicPr>
+          <p:nvPr/>
+        </p:nvPicPr>
+        <p:blipFill>
+          <a:blip r:embed="rId3"/>
+          <a:srcRect/>
+          <a:stretch>
+            <a:fillRect/>
+          </a:stretch>
+        </p:blipFill>
+        <p:spPr>
+          <a:xfrm>
             <a:off x="5819775" y="2068195"/>
             <a:ext cx="2294890" cy="2378710"/>
           </a:xfrm>
@@ -8932,12 +8366,12 @@
           <a:bodyPr wrap="none" rtlCol="0">
             <a:spAutoFit/>
           </a:bodyPr>
+          <a:lstStyle/>
           <a:p>
             <a:r>
               <a:rPr lang="en-US"/>
               <a:t>Before</a:t>
             </a:r>
-            <a:endParaRPr lang="en-US"/>
           </a:p>
         </p:txBody>
       </p:sp>
@@ -8961,12 +8395,12 @@
           <a:bodyPr wrap="none" rtlCol="0">
             <a:spAutoFit/>
           </a:bodyPr>
+          <a:lstStyle/>
           <a:p>
             <a:r>
               <a:rPr lang="en-US"/>
               <a:t>After : MSAA 16X</a:t>
             </a:r>
-            <a:endParaRPr lang="en-US"/>
           </a:p>
         </p:txBody>
       </p:sp>
@@ -8975,26 +8409,11 @@
   <p:clrMapOvr>
     <a:masterClrMapping/>
   </p:clrMapOvr>
-  <mc:AlternateContent xmlns:mc="http://schemas.openxmlformats.org/markup-compatibility/2006">
-    <mc:Choice xmlns:p14="http://schemas.microsoft.com/office/powerpoint/2010/main" Requires="p14">
-      <p:transition spd="slow" p14:dur="2000"/>
-    </mc:Choice>
-    <mc:Fallback>
-      <p:transition spd="slow"/>
-    </mc:Fallback>
-  </mc:AlternateContent>
-  <p:timing>
-    <p:tnLst>
-      <p:par>
-        <p:cTn id="1" dur="indefinite" restart="never" nodeType="tmRoot"/>
-      </p:par>
-    </p:tnLst>
-  </p:timing>
 </p:sld>
 </file>
 
 <file path=ppt/slides/slide9.xml><?xml version="1.0" encoding="utf-8"?>
-<p:sld xmlns:a="http://schemas.openxmlformats.org/drawingml/2006/main" xmlns:r="http://schemas.openxmlformats.org/officeDocument/2006/relationships" xmlns:p="http://schemas.openxmlformats.org/presentationml/2006/main" xmlns:p14="http://schemas.microsoft.com/office/powerpoint/2010/main">
+<p:sld xmlns:a="http://schemas.openxmlformats.org/drawingml/2006/main" xmlns:r="http://schemas.openxmlformats.org/officeDocument/2006/relationships" xmlns:p="http://schemas.openxmlformats.org/presentationml/2006/main">
   <p:cSld>
     <p:spTree>
       <p:nvGrpSpPr>
@@ -9031,10 +8450,9 @@
           <a:lstStyle/>
           <a:p>
             <a:r>
-              <a:rPr lang="en-US" altLang="ko-KR" dirty="0" smtClean="0"/>
+              <a:rPr lang="en-US" altLang="ko-KR" dirty="0"/>
               <a:t> MSAA</a:t>
             </a:r>
-            <a:endParaRPr lang="en-US" altLang="ko-KR" dirty="0" smtClean="0"/>
           </a:p>
         </p:txBody>
       </p:sp>
@@ -9062,38 +8480,12 @@
               <a:rPr lang="en-US" altLang="ko-KR" b="1" dirty="0"/>
               <a:t>MultiSample Anti Aliasing</a:t>
             </a:r>
-            <a:endParaRPr lang="en-US" altLang="ko-KR" b="1" dirty="0"/>
           </a:p>
         </p:txBody>
       </p:sp>
       <p:pic>
         <p:nvPicPr>
           <p:cNvPr id="4" name="Picture 3"/>
-          <p:cNvPicPr>
-            <a:picLocks noChangeAspect="1"/>
-          </p:cNvPicPr>
-          <p:nvPr/>
-        </p:nvPicPr>
-        <p:blipFill>
-          <a:blip r:embed="rId1"/>
-          <a:srcRect/>
-          <a:stretch>
-            <a:fillRect/>
-          </a:stretch>
-        </p:blipFill>
-        <p:spPr>
-          <a:xfrm>
-            <a:off x="1788160" y="1062355"/>
-            <a:ext cx="1557655" cy="1614805"/>
-          </a:xfrm>
-          <a:prstGeom prst="rect">
-            <a:avLst/>
-          </a:prstGeom>
-        </p:spPr>
-      </p:pic>
-      <p:pic>
-        <p:nvPicPr>
-          <p:cNvPr id="6" name="Picture 5"/>
           <p:cNvPicPr>
             <a:picLocks noChangeAspect="1"/>
           </p:cNvPicPr>
@@ -9108,7 +8500,7 @@
         </p:blipFill>
         <p:spPr>
           <a:xfrm>
-            <a:off x="3521710" y="1062355"/>
+            <a:off x="1788160" y="1062355"/>
             <a:ext cx="1557655" cy="1614805"/>
           </a:xfrm>
           <a:prstGeom prst="rect">
@@ -9116,67 +8508,9 @@
           </a:prstGeom>
         </p:spPr>
       </p:pic>
-      <p:sp>
-        <p:nvSpPr>
-          <p:cNvPr id="7" name="Text Box 6"/>
-          <p:cNvSpPr txBox="1"/>
-          <p:nvPr/>
-        </p:nvSpPr>
-        <p:spPr>
-          <a:xfrm>
-            <a:off x="2300605" y="2754630"/>
-            <a:ext cx="401320" cy="368300"/>
-          </a:xfrm>
-          <a:prstGeom prst="rect">
-            <a:avLst/>
-          </a:prstGeom>
-          <a:noFill/>
-        </p:spPr>
-        <p:txBody>
-          <a:bodyPr wrap="none" rtlCol="0">
-            <a:spAutoFit/>
-          </a:bodyPr>
-          <a:p>
-            <a:r>
-              <a:rPr lang="en-US"/>
-              <a:t>1X</a:t>
-            </a:r>
-            <a:endParaRPr lang="en-US"/>
-          </a:p>
-        </p:txBody>
-      </p:sp>
-      <p:sp>
-        <p:nvSpPr>
-          <p:cNvPr id="8" name="Text Box 7"/>
-          <p:cNvSpPr txBox="1"/>
-          <p:nvPr/>
-        </p:nvSpPr>
-        <p:spPr>
-          <a:xfrm>
-            <a:off x="4066540" y="2754630"/>
-            <a:ext cx="441325" cy="368300"/>
-          </a:xfrm>
-          <a:prstGeom prst="rect">
-            <a:avLst/>
-          </a:prstGeom>
-          <a:noFill/>
-        </p:spPr>
-        <p:txBody>
-          <a:bodyPr wrap="none" rtlCol="0">
-            <a:spAutoFit/>
-          </a:bodyPr>
-          <a:p>
-            <a:r>
-              <a:rPr lang="en-US"/>
-              <a:t>2X</a:t>
-            </a:r>
-            <a:endParaRPr lang="en-US"/>
-          </a:p>
-        </p:txBody>
-      </p:sp>
       <p:pic>
         <p:nvPicPr>
-          <p:cNvPr id="9" name="Picture 8"/>
+          <p:cNvPr id="6" name="Picture 5"/>
           <p:cNvPicPr>
             <a:picLocks noChangeAspect="1"/>
           </p:cNvPicPr>
@@ -9191,7 +8525,7 @@
         </p:blipFill>
         <p:spPr>
           <a:xfrm>
-            <a:off x="1798955" y="3122930"/>
+            <a:off x="3521710" y="1062355"/>
             <a:ext cx="1557655" cy="1614805"/>
           </a:xfrm>
           <a:prstGeom prst="rect">
@@ -9201,14 +8535,14 @@
       </p:pic>
       <p:sp>
         <p:nvSpPr>
-          <p:cNvPr id="10" name="Text Box 9"/>
+          <p:cNvPr id="7" name="Text Box 6"/>
           <p:cNvSpPr txBox="1"/>
           <p:nvPr/>
         </p:nvSpPr>
         <p:spPr>
           <a:xfrm>
-            <a:off x="2343785" y="4815205"/>
-            <a:ext cx="446405" cy="368300"/>
+            <a:off x="2300605" y="2754630"/>
+            <a:ext cx="401320" cy="368300"/>
           </a:xfrm>
           <a:prstGeom prst="rect">
             <a:avLst/>
@@ -9219,18 +8553,47 @@
           <a:bodyPr wrap="none" rtlCol="0">
             <a:spAutoFit/>
           </a:bodyPr>
+          <a:lstStyle/>
           <a:p>
             <a:r>
               <a:rPr lang="en-US"/>
-              <a:t>4X</a:t>
-            </a:r>
-            <a:endParaRPr lang="en-US"/>
+              <a:t>1X</a:t>
+            </a:r>
+          </a:p>
+        </p:txBody>
+      </p:sp>
+      <p:sp>
+        <p:nvSpPr>
+          <p:cNvPr id="8" name="Text Box 7"/>
+          <p:cNvSpPr txBox="1"/>
+          <p:nvPr/>
+        </p:nvSpPr>
+        <p:spPr>
+          <a:xfrm>
+            <a:off x="4066540" y="2754630"/>
+            <a:ext cx="441325" cy="368300"/>
+          </a:xfrm>
+          <a:prstGeom prst="rect">
+            <a:avLst/>
+          </a:prstGeom>
+          <a:noFill/>
+        </p:spPr>
+        <p:txBody>
+          <a:bodyPr wrap="none" rtlCol="0">
+            <a:spAutoFit/>
+          </a:bodyPr>
+          <a:lstStyle/>
+          <a:p>
+            <a:r>
+              <a:rPr lang="en-US"/>
+              <a:t>2X</a:t>
+            </a:r>
           </a:p>
         </p:txBody>
       </p:sp>
       <p:pic>
         <p:nvPicPr>
-          <p:cNvPr id="16" name="Picture 15"/>
+          <p:cNvPr id="9" name="Picture 8"/>
           <p:cNvPicPr>
             <a:picLocks noChangeAspect="1"/>
           </p:cNvPicPr>
@@ -9245,8 +8608,8 @@
         </p:blipFill>
         <p:spPr>
           <a:xfrm>
-            <a:off x="3563620" y="3125470"/>
-            <a:ext cx="1557655" cy="1609725"/>
+            <a:off x="1798955" y="3122930"/>
+            <a:ext cx="1557655" cy="1614805"/>
           </a:xfrm>
           <a:prstGeom prst="rect">
             <a:avLst/>
@@ -9255,14 +8618,14 @@
       </p:pic>
       <p:sp>
         <p:nvSpPr>
-          <p:cNvPr id="17" name="Text Box 16"/>
+          <p:cNvPr id="10" name="Text Box 9"/>
           <p:cNvSpPr txBox="1"/>
           <p:nvPr/>
         </p:nvSpPr>
         <p:spPr>
           <a:xfrm>
-            <a:off x="4108450" y="4815205"/>
-            <a:ext cx="450850" cy="368300"/>
+            <a:off x="2343785" y="4815205"/>
+            <a:ext cx="446405" cy="368300"/>
           </a:xfrm>
           <a:prstGeom prst="rect">
             <a:avLst/>
@@ -9273,18 +8636,18 @@
           <a:bodyPr wrap="none" rtlCol="0">
             <a:spAutoFit/>
           </a:bodyPr>
+          <a:lstStyle/>
           <a:p>
             <a:r>
               <a:rPr lang="en-US"/>
-              <a:t>8X</a:t>
-            </a:r>
-            <a:endParaRPr lang="en-US"/>
+              <a:t>4X</a:t>
+            </a:r>
           </a:p>
         </p:txBody>
       </p:sp>
       <p:pic>
         <p:nvPicPr>
-          <p:cNvPr id="18" name="Picture 17"/>
+          <p:cNvPr id="16" name="Picture 15"/>
           <p:cNvPicPr>
             <a:picLocks noChangeAspect="1"/>
           </p:cNvPicPr>
@@ -9299,8 +8662,8 @@
         </p:blipFill>
         <p:spPr>
           <a:xfrm>
-            <a:off x="6012815" y="1635760"/>
-            <a:ext cx="2294890" cy="2378710"/>
+            <a:off x="3563620" y="3125470"/>
+            <a:ext cx="1557655" cy="1609725"/>
           </a:xfrm>
           <a:prstGeom prst="rect">
             <a:avLst/>
@@ -9309,14 +8672,14 @@
       </p:pic>
       <p:sp>
         <p:nvSpPr>
-          <p:cNvPr id="19" name="Text Box 18"/>
+          <p:cNvPr id="17" name="Text Box 16"/>
           <p:cNvSpPr txBox="1"/>
           <p:nvPr/>
         </p:nvSpPr>
         <p:spPr>
           <a:xfrm>
-            <a:off x="6896100" y="4156075"/>
-            <a:ext cx="527685" cy="368300"/>
+            <a:off x="4108450" y="4815205"/>
+            <a:ext cx="450850" cy="368300"/>
           </a:xfrm>
           <a:prstGeom prst="rect">
             <a:avLst/>
@@ -9327,12 +8690,66 @@
           <a:bodyPr wrap="none" rtlCol="0">
             <a:spAutoFit/>
           </a:bodyPr>
+          <a:lstStyle/>
+          <a:p>
+            <a:r>
+              <a:rPr lang="en-US"/>
+              <a:t>8X</a:t>
+            </a:r>
+          </a:p>
+        </p:txBody>
+      </p:sp>
+      <p:pic>
+        <p:nvPicPr>
+          <p:cNvPr id="18" name="Picture 17"/>
+          <p:cNvPicPr>
+            <a:picLocks noChangeAspect="1"/>
+          </p:cNvPicPr>
+          <p:nvPr/>
+        </p:nvPicPr>
+        <p:blipFill>
+          <a:blip r:embed="rId6"/>
+          <a:srcRect/>
+          <a:stretch>
+            <a:fillRect/>
+          </a:stretch>
+        </p:blipFill>
+        <p:spPr>
+          <a:xfrm>
+            <a:off x="6012815" y="1635760"/>
+            <a:ext cx="2294890" cy="2378710"/>
+          </a:xfrm>
+          <a:prstGeom prst="rect">
+            <a:avLst/>
+          </a:prstGeom>
+        </p:spPr>
+      </p:pic>
+      <p:sp>
+        <p:nvSpPr>
+          <p:cNvPr id="19" name="Text Box 18"/>
+          <p:cNvSpPr txBox="1"/>
+          <p:nvPr/>
+        </p:nvSpPr>
+        <p:spPr>
+          <a:xfrm>
+            <a:off x="6896100" y="4156075"/>
+            <a:ext cx="527685" cy="368300"/>
+          </a:xfrm>
+          <a:prstGeom prst="rect">
+            <a:avLst/>
+          </a:prstGeom>
+          <a:noFill/>
+        </p:spPr>
+        <p:txBody>
+          <a:bodyPr wrap="none" rtlCol="0">
+            <a:spAutoFit/>
+          </a:bodyPr>
+          <a:lstStyle/>
           <a:p>
             <a:r>
               <a:rPr lang="en-US"/>
               <a:t>16X</a:t>
             </a:r>
-            <a:endParaRPr lang="en-US"/>
           </a:p>
         </p:txBody>
       </p:sp>
@@ -9341,29 +8758,7 @@
   <p:clrMapOvr>
     <a:masterClrMapping/>
   </p:clrMapOvr>
-  <mc:AlternateContent xmlns:mc="http://schemas.openxmlformats.org/markup-compatibility/2006">
-    <mc:Choice xmlns:p14="http://schemas.microsoft.com/office/powerpoint/2010/main" Requires="p14">
-      <p:transition spd="slow" p14:dur="2000"/>
-    </mc:Choice>
-    <mc:Fallback>
-      <p:transition spd="slow"/>
-    </mc:Fallback>
-  </mc:AlternateContent>
-  <p:timing>
-    <p:tnLst>
-      <p:par>
-        <p:cTn id="1" dur="indefinite" restart="never" nodeType="tmRoot"/>
-      </p:par>
-    </p:tnLst>
-  </p:timing>
 </p:sld>
-</file>
-
-<file path=ppt/tags/tag1.xml><?xml version="1.0" encoding="utf-8"?>
-<p:tagLst xmlns:p="http://schemas.openxmlformats.org/presentationml/2006/main">
-  <p:tag name="KSO_WM_MEDIACOVER_FLAG" val="1"/>
-  <p:tag name="KSO_WM_UNIT_MEDIACOVER_BTN_STATE" val="1"/>
-</p:tagLst>
 </file>
 
 <file path=ppt/theme/theme1.xml><?xml version="1.0" encoding="utf-8"?>
@@ -9646,6 +9041,8 @@
       </a:bgFillStyleLst>
     </a:fmtScheme>
   </a:themeElements>
+  <a:objectDefaults/>
+  <a:extraClrSchemeLst/>
   <a:extLst>
     <a:ext uri="{05A4C25C-085E-4340-85A3-A5531E510DB2}">
       <thm15:themeFamily xmlns:thm15="http://schemas.microsoft.com/office/thememl/2012/main" name="Office Theme" id="{62F939B6-93AF-4DB8-9C6B-D6C7DFDC589F}" vid="{4A3C46E8-61CC-4603-A589-7422A47A8E4A}"/>
@@ -9934,6 +9331,8 @@
       </a:bgFillStyleLst>
     </a:fmtScheme>
   </a:themeElements>
+  <a:objectDefaults/>
+  <a:extraClrSchemeLst/>
   <a:extLst>
     <a:ext uri="{05A4C25C-085E-4340-85A3-A5531E510DB2}">
       <thm15:themeFamily xmlns:thm15="http://schemas.microsoft.com/office/thememl/2012/main" name="Office Theme" id="{62F939B6-93AF-4DB8-9C6B-D6C7DFDC589F}" vid="{4A3C46E8-61CC-4603-A589-7422A47A8E4A}"/>

</xml_diff>